<commit_message>
Removed extra load of item
</commit_message>
<xml_diff>
--- a/Presentations/ConcurrentLinkedQueueRelaxed.pptx
+++ b/Presentations/ConcurrentLinkedQueueRelaxed.pptx
@@ -758,7 +758,7 @@
             <a:fld id="{1D8BD707-D9CF-40AE-B4C6-C98DA3205C09}" type="datetimeFigureOut">
               <a:rPr lang="en-US" smtClean="0"/>
               <a:pPr/>
-              <a:t>11/3/2014</a:t>
+              <a:t>11/5/2014</a:t>
             </a:fld>
             <a:endParaRPr lang="en-US"/>
           </a:p>
@@ -956,7 +956,7 @@
             <a:fld id="{1D8BD707-D9CF-40AE-B4C6-C98DA3205C09}" type="datetimeFigureOut">
               <a:rPr lang="en-US" smtClean="0"/>
               <a:pPr/>
-              <a:t>11/3/2014</a:t>
+              <a:t>11/5/2014</a:t>
             </a:fld>
             <a:endParaRPr lang="en-US"/>
           </a:p>
@@ -1143,7 +1143,7 @@
             <a:fld id="{1D8BD707-D9CF-40AE-B4C6-C98DA3205C09}" type="datetimeFigureOut">
               <a:rPr lang="en-US" smtClean="0"/>
               <a:pPr/>
-              <a:t>11/3/2014</a:t>
+              <a:t>11/5/2014</a:t>
             </a:fld>
             <a:endParaRPr lang="en-US"/>
           </a:p>
@@ -1295,7 +1295,7 @@
             <a:fld id="{1D8BD707-D9CF-40AE-B4C6-C98DA3205C09}" type="datetimeFigureOut">
               <a:rPr lang="en-US" smtClean="0"/>
               <a:pPr/>
-              <a:t>11/3/2014</a:t>
+              <a:t>11/5/2014</a:t>
             </a:fld>
             <a:endParaRPr lang="en-US"/>
           </a:p>
@@ -1552,7 +1552,7 @@
             <a:fld id="{1D8BD707-D9CF-40AE-B4C6-C98DA3205C09}" type="datetimeFigureOut">
               <a:rPr lang="en-US" smtClean="0"/>
               <a:pPr/>
-              <a:t>11/3/2014</a:t>
+              <a:t>11/5/2014</a:t>
             </a:fld>
             <a:endParaRPr lang="en-US"/>
           </a:p>
@@ -1963,7 +1963,7 @@
             <a:fld id="{1D8BD707-D9CF-40AE-B4C6-C98DA3205C09}" type="datetimeFigureOut">
               <a:rPr lang="en-US" smtClean="0"/>
               <a:pPr/>
-              <a:t>11/3/2014</a:t>
+              <a:t>11/5/2014</a:t>
             </a:fld>
             <a:endParaRPr lang="en-US"/>
           </a:p>
@@ -2411,7 +2411,7 @@
             <a:fld id="{1D8BD707-D9CF-40AE-B4C6-C98DA3205C09}" type="datetimeFigureOut">
               <a:rPr lang="en-US" smtClean="0"/>
               <a:pPr/>
-              <a:t>11/3/2014</a:t>
+              <a:t>11/5/2014</a:t>
             </a:fld>
             <a:endParaRPr lang="en-US"/>
           </a:p>
@@ -2514,7 +2514,7 @@
             <a:fld id="{1D8BD707-D9CF-40AE-B4C6-C98DA3205C09}" type="datetimeFigureOut">
               <a:rPr lang="en-US" smtClean="0"/>
               <a:pPr/>
-              <a:t>11/3/2014</a:t>
+              <a:t>11/5/2014</a:t>
             </a:fld>
             <a:endParaRPr lang="en-US"/>
           </a:p>
@@ -2637,7 +2637,7 @@
             <a:fld id="{1D8BD707-D9CF-40AE-B4C6-C98DA3205C09}" type="datetimeFigureOut">
               <a:rPr lang="en-US" smtClean="0"/>
               <a:pPr/>
-              <a:t>11/3/2014</a:t>
+              <a:t>11/5/2014</a:t>
             </a:fld>
             <a:endParaRPr lang="en-US"/>
           </a:p>
@@ -2913,7 +2913,7 @@
             <a:fld id="{1D8BD707-D9CF-40AE-B4C6-C98DA3205C09}" type="datetimeFigureOut">
               <a:rPr lang="en-US" smtClean="0"/>
               <a:pPr/>
-              <a:t>11/3/2014</a:t>
+              <a:t>11/5/2014</a:t>
             </a:fld>
             <a:endParaRPr lang="en-US"/>
           </a:p>
@@ -3120,7 +3120,7 @@
             <a:fld id="{1D8BD707-D9CF-40AE-B4C6-C98DA3205C09}" type="datetimeFigureOut">
               <a:rPr lang="en-US" smtClean="0"/>
               <a:pPr/>
-              <a:t>11/3/2014</a:t>
+              <a:t>11/5/2014</a:t>
             </a:fld>
             <a:endParaRPr lang="en-US"/>
           </a:p>
@@ -4231,7 +4231,7 @@
             <a:fld id="{1D8BD707-D9CF-40AE-B4C6-C98DA3205C09}" type="datetimeFigureOut">
               <a:rPr lang="en-US" smtClean="0"/>
               <a:pPr/>
-              <a:t>11/3/2014</a:t>
+              <a:t>11/5/2014</a:t>
             </a:fld>
             <a:endParaRPr lang="en-US"/>
           </a:p>
@@ -4818,13 +4818,8 @@
             </a:r>
             <a:r>
               <a:rPr lang="en-US" sz="1200" dirty="0" smtClean="0"/>
-              <a:t>, then it means that this node has been logically </a:t>
-            </a:r>
-            <a:r>
-              <a:rPr lang="en-US" sz="1200" dirty="0" smtClean="0"/>
-              <a:t>removed, but under special circumstances, there may be re-ordering of instructions, so we need to check again with an acquire-load that it is really null;</a:t>
-            </a:r>
-            <a:endParaRPr lang="en-US" sz="1200" dirty="0" smtClean="0"/>
+              <a:t>, then it means that this node has been logically removed, but under special circumstances, there may be re-ordering of instructions, so we need to check again with an acquire-load that it is really null;</a:t>
+            </a:r>
           </a:p>
           <a:p>
             <a:pPr lvl="1"/>
@@ -5134,15 +5129,7 @@
           <a:p>
             <a:r>
               <a:rPr lang="en-US" sz="1400" dirty="0" smtClean="0"/>
-              <a:t>When a node is </a:t>
-            </a:r>
-            <a:r>
-              <a:rPr lang="en-US" sz="1400" dirty="0" smtClean="0"/>
-              <a:t>created, </a:t>
-            </a:r>
-            <a:r>
-              <a:rPr lang="en-US" sz="1400" dirty="0" smtClean="0"/>
-              <a:t>its </a:t>
+              <a:t>When a node is created, its </a:t>
             </a:r>
             <a:r>
               <a:rPr lang="en-US" sz="1400" dirty="0" smtClean="0">
@@ -6430,77 +6417,29 @@
               <a:t>o.equals</a:t>
             </a:r>
             <a:r>
-              <a:rPr lang="en-US" sz="1200" dirty="0">
-                <a:solidFill>
-                  <a:srgbClr val="000000"/>
-                </a:solidFill>
-                <a:latin typeface="Consolas"/>
-              </a:rPr>
-              <a:t>(item) </a:t>
-            </a:r>
-            <a:r>
-              <a:rPr lang="en-US" sz="1200" b="1" dirty="0">
-                <a:solidFill>
-                  <a:srgbClr val="000000"/>
-                </a:solidFill>
-                <a:latin typeface="Consolas"/>
-              </a:rPr>
-              <a:t>&amp;&amp; </a:t>
-            </a:r>
-            <a:r>
-              <a:rPr lang="en-US" sz="1200" b="1" dirty="0" err="1" smtClean="0">
-                <a:solidFill>
-                  <a:srgbClr val="000000"/>
-                </a:solidFill>
-                <a:latin typeface="Consolas"/>
-              </a:rPr>
-              <a:t>p.</a:t>
-            </a:r>
-            <a:r>
-              <a:rPr lang="en-US" sz="1200" b="1" dirty="0" err="1" smtClean="0">
-                <a:solidFill>
-                  <a:srgbClr val="0000C0"/>
-                </a:solidFill>
-                <a:latin typeface="Consolas"/>
-              </a:rPr>
-              <a:t>item</a:t>
-            </a:r>
-            <a:r>
-              <a:rPr lang="en-US" sz="1200" b="1" dirty="0" smtClean="0">
-                <a:solidFill>
-                  <a:srgbClr val="000000"/>
-                </a:solidFill>
-                <a:latin typeface="Consolas"/>
-              </a:rPr>
-              <a:t> </a:t>
-            </a:r>
-            <a:r>
-              <a:rPr lang="en-US" sz="1200" b="1" dirty="0">
-                <a:solidFill>
-                  <a:srgbClr val="000000"/>
-                </a:solidFill>
-                <a:latin typeface="Consolas"/>
-              </a:rPr>
-              <a:t>!= </a:t>
-            </a:r>
-            <a:r>
-              <a:rPr lang="en-US" sz="1200" b="1" dirty="0">
-                <a:solidFill>
-                  <a:srgbClr val="7F0055"/>
-                </a:solidFill>
-                <a:latin typeface="Consolas"/>
-              </a:rPr>
-              <a:t>null</a:t>
-            </a:r>
-            <a:r>
-              <a:rPr lang="en-US" sz="1200" dirty="0">
-                <a:solidFill>
-                  <a:srgbClr val="000000"/>
-                </a:solidFill>
-                <a:latin typeface="Consolas"/>
-              </a:rPr>
-              <a:t>)</a:t>
-            </a:r>
+              <a:rPr lang="en-US" sz="1200">
+                <a:solidFill>
+                  <a:srgbClr val="000000"/>
+                </a:solidFill>
+                <a:latin typeface="Consolas"/>
+              </a:rPr>
+              <a:t>(item</a:t>
+            </a:r>
+            <a:r>
+              <a:rPr lang="en-US" sz="1200" smtClean="0">
+                <a:solidFill>
+                  <a:srgbClr val="000000"/>
+                </a:solidFill>
+                <a:latin typeface="Consolas"/>
+              </a:rPr>
+              <a:t>))</a:t>
+            </a:r>
+            <a:endParaRPr lang="en-US" sz="1200" dirty="0">
+              <a:solidFill>
+                <a:srgbClr val="000000"/>
+              </a:solidFill>
+              <a:latin typeface="Consolas"/>
+            </a:endParaRPr>
           </a:p>
           <a:p>
             <a:r>
@@ -10887,7 +10826,6 @@
               <a:rPr lang="en-US" sz="1600" dirty="0" smtClean="0"/>
               <a:t>). This performance is noticeable even if a single thread is being used.</a:t>
             </a:r>
-            <a:endParaRPr lang="en-US" sz="1600" dirty="0" smtClean="0"/>
           </a:p>
           <a:p>
             <a:endParaRPr lang="en-US" sz="1600" dirty="0" smtClean="0"/>
@@ -10967,15 +10905,7 @@
             </a:r>
             <a:r>
               <a:rPr lang="en-US" sz="1600" dirty="0" smtClean="0"/>
-              <a:t> performs </a:t>
-            </a:r>
-            <a:r>
-              <a:rPr lang="en-US" sz="1600" dirty="0" smtClean="0"/>
-              <a:t>worse </a:t>
-            </a:r>
-            <a:r>
-              <a:rPr lang="en-US" sz="1600" dirty="0" smtClean="0"/>
-              <a:t>than CLQ.</a:t>
+              <a:t> performs worse than CLQ.</a:t>
             </a:r>
           </a:p>
           <a:p>
@@ -17754,7 +17684,6 @@
               <a:rPr lang="en-US" dirty="0"/>
               <a:t> if it is null?</a:t>
             </a:r>
-            <a:endParaRPr lang="en-US" dirty="0"/>
           </a:p>
         </p:txBody>
       </p:sp>
@@ -17943,11 +17872,7 @@
           <a:p>
             <a:r>
               <a:rPr lang="en-US" sz="1600" dirty="0" smtClean="0"/>
-              <a:t>At a lack of a better name, we used the term “relaxed atomics” </a:t>
-            </a:r>
-            <a:r>
-              <a:rPr lang="en-US" sz="1600" dirty="0" smtClean="0"/>
-              <a:t>to named non-volatile references in Java. The JVM Memory Model does not give the exact same guarantees for references as the C++1x Memory Model gives for relaxed atomics, but they are similar in behavior when it comes to the way we’re using them for these optimizations (we only do loads), so at a lack of a better name, we call them “relaxed atomics” as well. </a:t>
+              <a:t>At a lack of a better name, we used the term “relaxed atomics” to named non-volatile references in Java. The JVM Memory Model does not give the exact same guarantees for references as the C++1x Memory Model gives for relaxed atomics, but they are similar in behavior when it comes to the way we’re using them for these optimizations (we only do loads), so at a lack of a better name, we call them “relaxed atomics” as well. </a:t>
             </a:r>
           </a:p>
           <a:p>
@@ -19664,11 +19589,7 @@
             </a:r>
             <a:r>
               <a:rPr lang="en-US" dirty="0" smtClean="0"/>
-              <a:t> to </a:t>
-            </a:r>
-            <a:r>
-              <a:rPr lang="en-US" dirty="0" smtClean="0"/>
-              <a:t>use relaxed list traversal?</a:t>
+              <a:t> to use relaxed list traversal?</a:t>
             </a:r>
             <a:endParaRPr lang="en-US" dirty="0"/>
           </a:p>
@@ -20001,16 +19922,7 @@
                 </a:solidFill>
                 <a:latin typeface="Consolas"/>
               </a:rPr>
-              <a:t> = </a:t>
-            </a:r>
-            <a:r>
-              <a:rPr lang="en-US" b="1" dirty="0">
-                <a:solidFill>
-                  <a:srgbClr val="000000"/>
-                </a:solidFill>
-                <a:latin typeface="Consolas"/>
-              </a:rPr>
-              <a:t>(E)</a:t>
+              <a:t> = (E)</a:t>
             </a:r>
             <a:r>
               <a:rPr lang="en-US" b="1" i="1" dirty="0" err="1">
@@ -20099,16 +20011,7 @@
                 </a:solidFill>
                 <a:latin typeface="Consolas"/>
               </a:rPr>
-              <a:t>   </a:t>
-            </a:r>
-            <a:r>
-              <a:rPr lang="en-US" b="1" dirty="0" smtClean="0">
-                <a:solidFill>
-                  <a:srgbClr val="7F0055"/>
-                </a:solidFill>
-                <a:latin typeface="Consolas"/>
-              </a:rPr>
-              <a:t>return</a:t>
+              <a:t>   return</a:t>
             </a:r>
             <a:r>
               <a:rPr lang="en-US" b="1" dirty="0" smtClean="0">

</xml_diff>

<commit_message>
Re-added missing p.item with acquire load in contains()
</commit_message>
<xml_diff>
--- a/Presentations/ConcurrentLinkedQueueRelaxed.pptx
+++ b/Presentations/ConcurrentLinkedQueueRelaxed.pptx
@@ -29,8 +29,7 @@
     <p:sldId id="279" r:id="rId23"/>
     <p:sldId id="280" r:id="rId24"/>
     <p:sldId id="281" r:id="rId25"/>
-    <p:sldId id="282" r:id="rId26"/>
-    <p:sldId id="283" r:id="rId27"/>
+    <p:sldId id="283" r:id="rId26"/>
   </p:sldIdLst>
   <p:sldSz cx="9144000" cy="6858000" type="screen4x3"/>
   <p:notesSz cx="6858000" cy="9144000"/>
@@ -4818,8 +4817,13 @@
             </a:r>
             <a:r>
               <a:rPr lang="en-US" sz="1200" dirty="0" smtClean="0"/>
-              <a:t>, then it means that this node has been logically removed, but under special circumstances, there may be re-ordering of instructions, so we need to check again with an acquire-load that it is really null;</a:t>
-            </a:r>
+              <a:t>, then it means that this node has been logically </a:t>
+            </a:r>
+            <a:r>
+              <a:rPr lang="en-US" sz="1200" dirty="0" smtClean="0"/>
+              <a:t>removed;</a:t>
+            </a:r>
+            <a:endParaRPr lang="en-US" sz="1200" dirty="0" smtClean="0"/>
           </a:p>
           <a:p>
             <a:pPr lvl="1"/>
@@ -5191,19 +5195,43 @@
           <a:p>
             <a:r>
               <a:rPr lang="en-US" sz="1400" dirty="0" smtClean="0"/>
-              <a:t>After a node is logically removed and then unlinked, to help the GC, in the CLQ we set the </a:t>
+              <a:t>After a node is logically removed </a:t>
+            </a:r>
+            <a:r>
+              <a:rPr lang="en-US" sz="1400" dirty="0" smtClean="0"/>
+              <a:t>by </a:t>
             </a:r>
             <a:r>
               <a:rPr lang="en-US" sz="1400" dirty="0" smtClean="0">
                 <a:latin typeface="Consolas" panose="020B0609020204030204" pitchFamily="49" charset="0"/>
                 <a:cs typeface="Consolas" panose="020B0609020204030204" pitchFamily="49" charset="0"/>
               </a:rPr>
+              <a:t>poll()</a:t>
+            </a:r>
+            <a:r>
+              <a:rPr lang="en-US" sz="1400" dirty="0" smtClean="0"/>
+              <a:t> from the beginning of the list, </a:t>
+            </a:r>
+            <a:r>
+              <a:rPr lang="en-US" sz="1400" dirty="0" smtClean="0"/>
+              <a:t>to help the GC, in the CLQ we set the </a:t>
+            </a:r>
+            <a:r>
+              <a:rPr lang="en-US" sz="1400" dirty="0" smtClean="0">
+                <a:latin typeface="Consolas" panose="020B0609020204030204" pitchFamily="49" charset="0"/>
+                <a:cs typeface="Consolas" panose="020B0609020204030204" pitchFamily="49" charset="0"/>
+              </a:rPr>
               <a:t>next</a:t>
             </a:r>
             <a:r>
               <a:rPr lang="en-US" sz="1400" dirty="0" smtClean="0"/>
-              <a:t> to reference the node itself, and this is the final state, from which there is no further transitions.</a:t>
-            </a:r>
+              <a:t> to reference the node itself, and this is the final state, from which there is no further </a:t>
+            </a:r>
+            <a:r>
+              <a:rPr lang="en-US" sz="1400" dirty="0" smtClean="0"/>
+              <a:t>transition.</a:t>
+            </a:r>
+            <a:endParaRPr lang="en-US" sz="1400" dirty="0" smtClean="0"/>
           </a:p>
           <a:p>
             <a:endParaRPr lang="en-US" sz="1400" dirty="0"/>
@@ -6417,7 +6445,7 @@
               <a:t>o.equals</a:t>
             </a:r>
             <a:r>
-              <a:rPr lang="en-US" sz="1200">
+              <a:rPr lang="en-US" sz="1200" dirty="0">
                 <a:solidFill>
                   <a:srgbClr val="000000"/>
                 </a:solidFill>
@@ -6426,13 +6454,49 @@
               <a:t>(item</a:t>
             </a:r>
             <a:r>
-              <a:rPr lang="en-US" sz="1200" smtClean="0">
-                <a:solidFill>
-                  <a:srgbClr val="000000"/>
-                </a:solidFill>
-                <a:latin typeface="Consolas"/>
-              </a:rPr>
-              <a:t>))</a:t>
+              <a:rPr lang="en-US" sz="1200" dirty="0" smtClean="0">
+                <a:solidFill>
+                  <a:srgbClr val="000000"/>
+                </a:solidFill>
+                <a:latin typeface="Consolas"/>
+              </a:rPr>
+              <a:t>) &amp;&amp; </a:t>
+            </a:r>
+            <a:r>
+              <a:rPr lang="en-US" sz="1200" b="1" dirty="0" err="1">
+                <a:solidFill>
+                  <a:srgbClr val="000000"/>
+                </a:solidFill>
+                <a:latin typeface="Consolas"/>
+              </a:rPr>
+              <a:t>p.</a:t>
+            </a:r>
+            <a:r>
+              <a:rPr lang="en-US" sz="1200" b="1" dirty="0" err="1">
+                <a:solidFill>
+                  <a:srgbClr val="0000C0"/>
+                </a:solidFill>
+                <a:latin typeface="Consolas"/>
+              </a:rPr>
+              <a:t>item</a:t>
+            </a:r>
+            <a:r>
+              <a:rPr lang="en-US" sz="1200" b="1" dirty="0" smtClean="0">
+                <a:solidFill>
+                  <a:srgbClr val="000000"/>
+                </a:solidFill>
+                <a:latin typeface="Consolas"/>
+              </a:rPr>
+              <a:t> != null</a:t>
+            </a:r>
+            <a:r>
+              <a:rPr lang="en-US" sz="1200" dirty="0" smtClean="0">
+                <a:solidFill>
+                  <a:srgbClr val="000000"/>
+                </a:solidFill>
+                <a:latin typeface="Consolas"/>
+              </a:rPr>
+              <a:t>)</a:t>
             </a:r>
             <a:endParaRPr lang="en-US" sz="1200" dirty="0">
               <a:solidFill>
@@ -9234,17 +9298,25 @@
             <a:pPr lvl="1"/>
             <a:r>
               <a:rPr lang="en-US" sz="1200" dirty="0" smtClean="0"/>
-              <a:t>Items removed through remove()/poll() become logically removed when the value of item is read, either on line 3 of contains() when </a:t>
-            </a:r>
-            <a:r>
-              <a:rPr lang="en-US" sz="1200" dirty="0" err="1" smtClean="0">
+              <a:t>Items removed through remove()/poll() become logically removed when the value of item is </a:t>
+            </a:r>
+            <a:r>
+              <a:rPr lang="en-US" sz="1200" dirty="0" smtClean="0"/>
+              <a:t>read on </a:t>
+            </a:r>
+            <a:r>
+              <a:rPr lang="en-US" sz="1200" dirty="0" smtClean="0"/>
+              <a:t>line 3 of contains() when </a:t>
+            </a:r>
+            <a:r>
+              <a:rPr lang="en-US" sz="1200" dirty="0" err="1">
                 <a:latin typeface="Consolas" panose="020B0609020204030204" pitchFamily="49" charset="0"/>
                 <a:cs typeface="Consolas" panose="020B0609020204030204" pitchFamily="49" charset="0"/>
               </a:rPr>
               <a:t>p.getRelaxedItem</a:t>
             </a:r>
             <a:r>
-              <a:rPr lang="en-US" sz="1200" dirty="0" smtClean="0">
+              <a:rPr lang="en-US" sz="1200" dirty="0">
                 <a:latin typeface="Consolas" panose="020B0609020204030204" pitchFamily="49" charset="0"/>
                 <a:cs typeface="Consolas" panose="020B0609020204030204" pitchFamily="49" charset="0"/>
               </a:rPr>
@@ -9252,23 +9324,20 @@
             </a:r>
             <a:r>
               <a:rPr lang="en-US" sz="1200" dirty="0"/>
-              <a:t> </a:t>
-            </a:r>
-            <a:r>
-              <a:rPr lang="en-US" sz="1200" dirty="0" smtClean="0"/>
-              <a:t>returns null or on line 4 when reading </a:t>
-            </a:r>
-            <a:r>
-              <a:rPr lang="en-US" sz="1200" dirty="0" err="1" smtClean="0">
+              <a:t> returns null or on line 4 when reading </a:t>
+            </a:r>
+            <a:r>
+              <a:rPr lang="en-US" sz="1200" dirty="0" err="1">
                 <a:latin typeface="Consolas" panose="020B0609020204030204" pitchFamily="49" charset="0"/>
                 <a:cs typeface="Consolas" panose="020B0609020204030204" pitchFamily="49" charset="0"/>
               </a:rPr>
               <a:t>p.item</a:t>
             </a:r>
             <a:r>
-              <a:rPr lang="en-US" sz="1200" dirty="0" smtClean="0"/>
+              <a:rPr lang="en-US" sz="1200" dirty="0"/>
               <a:t> with an acquire load;</a:t>
             </a:r>
+            <a:endParaRPr lang="en-US" sz="1200" dirty="0" smtClean="0"/>
           </a:p>
           <a:p>
             <a:r>
@@ -17624,254 +17693,6 @@
           <a:p>
             <a:r>
               <a:rPr lang="en-US" sz="1600" dirty="0" smtClean="0"/>
-              <a:t>On </a:t>
-            </a:r>
-            <a:r>
-              <a:rPr lang="en-US" sz="1600" dirty="0" err="1" smtClean="0"/>
-              <a:t>getRelaxedItem</a:t>
-            </a:r>
-            <a:r>
-              <a:rPr lang="en-US" sz="1600" dirty="0" smtClean="0"/>
-              <a:t>() we do a second load (a volatile load) if the first load (a relaxed load) is null. We do this because there may be situations where the relaxed load gets reordered and breaks sequential consistency. An example is if contains() gets </a:t>
-            </a:r>
-            <a:r>
-              <a:rPr lang="en-US" sz="1600" dirty="0" err="1" smtClean="0"/>
-              <a:t>inlined</a:t>
-            </a:r>
-            <a:r>
-              <a:rPr lang="en-US" sz="1600" dirty="0" smtClean="0"/>
-              <a:t> and returns and then a volatile load of another variable that has an happens-before with some event gets broken because the relaxed load has been moved to after the volatile load of that other variable… it’s a complex scenario</a:t>
-            </a:r>
-          </a:p>
-          <a:p>
-            <a:r>
-              <a:rPr lang="en-US" sz="1600" dirty="0" smtClean="0"/>
-              <a:t>Another way to reason about it is that, it is just safer to do the volatile load and the code path is so rare, that having the volatile load in that situation does not reduce the performance.</a:t>
-            </a:r>
-            <a:endParaRPr lang="en-US" sz="1600" dirty="0"/>
-          </a:p>
-        </p:txBody>
-      </p:sp>
-      <p:sp>
-        <p:nvSpPr>
-          <p:cNvPr id="2" name="Title 1"/>
-          <p:cNvSpPr>
-            <a:spLocks noGrp="1"/>
-          </p:cNvSpPr>
-          <p:nvPr>
-            <p:ph type="title"/>
-          </p:nvPr>
-        </p:nvSpPr>
-        <p:spPr/>
-        <p:txBody>
-          <a:bodyPr>
-            <a:normAutofit fontScale="90000"/>
-          </a:bodyPr>
-          <a:lstStyle/>
-          <a:p>
-            <a:r>
-              <a:rPr lang="en-US" dirty="0" smtClean="0"/>
-              <a:t>Why do we need an acquire-load on </a:t>
-            </a:r>
-            <a:r>
-              <a:rPr lang="en-US" dirty="0" smtClean="0">
-                <a:latin typeface="Consolas" panose="020B0609020204030204" pitchFamily="49" charset="0"/>
-                <a:cs typeface="Consolas" panose="020B0609020204030204" pitchFamily="49" charset="0"/>
-              </a:rPr>
-              <a:t>item</a:t>
-            </a:r>
-            <a:r>
-              <a:rPr lang="en-US" dirty="0"/>
-              <a:t> if it is null?</a:t>
-            </a:r>
-          </a:p>
-        </p:txBody>
-      </p:sp>
-      <p:sp>
-        <p:nvSpPr>
-          <p:cNvPr id="4" name="Oval 3"/>
-          <p:cNvSpPr/>
-          <p:nvPr/>
-        </p:nvSpPr>
-        <p:spPr>
-          <a:xfrm>
-            <a:off x="7010400" y="5943600"/>
-            <a:ext cx="1752600" cy="609600"/>
-          </a:xfrm>
-          <a:prstGeom prst="ellipse">
-            <a:avLst/>
-          </a:prstGeom>
-        </p:spPr>
-        <p:style>
-          <a:lnRef idx="2">
-            <a:schemeClr val="accent1">
-              <a:shade val="50000"/>
-            </a:schemeClr>
-          </a:lnRef>
-          <a:fillRef idx="1">
-            <a:schemeClr val="accent1"/>
-          </a:fillRef>
-          <a:effectRef idx="0">
-            <a:schemeClr val="accent1"/>
-          </a:effectRef>
-          <a:fontRef idx="minor">
-            <a:schemeClr val="lt1"/>
-          </a:fontRef>
-        </p:style>
-        <p:txBody>
-          <a:bodyPr rtlCol="0" anchor="ctr"/>
-          <a:lstStyle/>
-          <a:p>
-            <a:pPr algn="ctr"/>
-            <a:r>
-              <a:rPr lang="en-US" dirty="0" smtClean="0"/>
-              <a:t>null</a:t>
-            </a:r>
-            <a:endParaRPr lang="en-US" dirty="0"/>
-          </a:p>
-        </p:txBody>
-      </p:sp>
-      <p:sp>
-        <p:nvSpPr>
-          <p:cNvPr id="5" name="Oval 4"/>
-          <p:cNvSpPr/>
-          <p:nvPr/>
-        </p:nvSpPr>
-        <p:spPr>
-          <a:xfrm>
-            <a:off x="4419600" y="5940582"/>
-            <a:ext cx="1752600" cy="609600"/>
-          </a:xfrm>
-          <a:prstGeom prst="ellipse">
-            <a:avLst/>
-          </a:prstGeom>
-        </p:spPr>
-        <p:style>
-          <a:lnRef idx="2">
-            <a:schemeClr val="accent1">
-              <a:shade val="50000"/>
-            </a:schemeClr>
-          </a:lnRef>
-          <a:fillRef idx="1">
-            <a:schemeClr val="accent1"/>
-          </a:fillRef>
-          <a:effectRef idx="0">
-            <a:schemeClr val="accent1"/>
-          </a:effectRef>
-          <a:fontRef idx="minor">
-            <a:schemeClr val="lt1"/>
-          </a:fontRef>
-        </p:style>
-        <p:txBody>
-          <a:bodyPr rtlCol="0" anchor="ctr"/>
-          <a:lstStyle/>
-          <a:p>
-            <a:pPr algn="ctr"/>
-            <a:r>
-              <a:rPr lang="en-US" dirty="0" smtClean="0"/>
-              <a:t>non-null item</a:t>
-            </a:r>
-            <a:endParaRPr lang="en-US" dirty="0"/>
-          </a:p>
-        </p:txBody>
-      </p:sp>
-      <p:cxnSp>
-        <p:nvCxnSpPr>
-          <p:cNvPr id="7" name="Straight Arrow Connector 6"/>
-          <p:cNvCxnSpPr>
-            <a:stCxn id="5" idx="6"/>
-            <a:endCxn id="4" idx="2"/>
-          </p:cNvCxnSpPr>
-          <p:nvPr/>
-        </p:nvCxnSpPr>
-        <p:spPr>
-          <a:xfrm>
-            <a:off x="6172200" y="6245382"/>
-            <a:ext cx="838200" cy="3018"/>
-          </a:xfrm>
-          <a:prstGeom prst="straightConnector1">
-            <a:avLst/>
-          </a:prstGeom>
-          <a:ln w="25400">
-            <a:tailEnd type="arrow"/>
-          </a:ln>
-        </p:spPr>
-        <p:style>
-          <a:lnRef idx="1">
-            <a:schemeClr val="accent1"/>
-          </a:lnRef>
-          <a:fillRef idx="0">
-            <a:schemeClr val="accent1"/>
-          </a:fillRef>
-          <a:effectRef idx="0">
-            <a:schemeClr val="accent1"/>
-          </a:effectRef>
-          <a:fontRef idx="minor">
-            <a:schemeClr val="tx1"/>
-          </a:fontRef>
-        </p:style>
-      </p:cxnSp>
-    </p:spTree>
-    <p:extLst>
-      <p:ext uri="{BB962C8B-B14F-4D97-AF65-F5344CB8AC3E}">
-        <p14:creationId xmlns:p14="http://schemas.microsoft.com/office/powerpoint/2010/main" val="18170832"/>
-      </p:ext>
-    </p:extLst>
-  </p:cSld>
-  <p:clrMapOvr>
-    <a:masterClrMapping/>
-  </p:clrMapOvr>
-  <p:timing>
-    <p:tnLst>
-      <p:par>
-        <p:cTn id="1" dur="indefinite" restart="never" nodeType="tmRoot"/>
-      </p:par>
-    </p:tnLst>
-  </p:timing>
-</p:sld>
-</file>
-
-<file path=ppt/slides/slide26.xml><?xml version="1.0" encoding="utf-8"?>
-<p:sld xmlns:a="http://schemas.openxmlformats.org/drawingml/2006/main" xmlns:r="http://schemas.openxmlformats.org/officeDocument/2006/relationships" xmlns:p="http://schemas.openxmlformats.org/presentationml/2006/main">
-  <p:cSld>
-    <p:spTree>
-      <p:nvGrpSpPr>
-        <p:cNvPr id="1" name=""/>
-        <p:cNvGrpSpPr/>
-        <p:nvPr/>
-      </p:nvGrpSpPr>
-      <p:grpSpPr>
-        <a:xfrm>
-          <a:off x="0" y="0"/>
-          <a:ext cx="0" cy="0"/>
-          <a:chOff x="0" y="0"/>
-          <a:chExt cx="0" cy="0"/>
-        </a:xfrm>
-      </p:grpSpPr>
-      <p:sp>
-        <p:nvSpPr>
-          <p:cNvPr id="3" name="Content Placeholder 2"/>
-          <p:cNvSpPr>
-            <a:spLocks noGrp="1"/>
-          </p:cNvSpPr>
-          <p:nvPr>
-            <p:ph idx="1"/>
-          </p:nvPr>
-        </p:nvSpPr>
-        <p:spPr>
-          <a:xfrm>
-            <a:off x="152400" y="1481328"/>
-            <a:ext cx="8763000" cy="3471672"/>
-          </a:xfrm>
-        </p:spPr>
-        <p:txBody>
-          <a:bodyPr>
-            <a:normAutofit/>
-          </a:bodyPr>
-          <a:lstStyle/>
-          <a:p>
-            <a:r>
-              <a:rPr lang="en-US" sz="1600" dirty="0" smtClean="0"/>
               <a:t>At a lack of a better name, we used the term “relaxed atomics” to named non-volatile references in Java. The JVM Memory Model does not give the exact same guarantees for references as the C++1x Memory Model gives for relaxed atomics, but they are similar in behavior when it comes to the way we’re using them for these optimizations (we only do loads), so at a lack of a better name, we call them “relaxed atomics” as well. </a:t>
             </a:r>
           </a:p>
@@ -19846,7 +19667,7 @@
         <p:spPr>
           <a:xfrm>
             <a:off x="1893683" y="4343400"/>
-            <a:ext cx="7239000" cy="2308324"/>
+            <a:ext cx="7239000" cy="2031325"/>
           </a:xfrm>
           <a:prstGeom prst="rect">
             <a:avLst/>
@@ -19895,7 +19716,16 @@
                 </a:solidFill>
                 <a:latin typeface="Consolas"/>
               </a:rPr>
-              <a:t>    </a:t>
+              <a:t>    return</a:t>
+            </a:r>
+            <a:r>
+              <a:rPr lang="en-US" b="1" dirty="0" smtClean="0">
+                <a:solidFill>
+                  <a:srgbClr val="000000"/>
+                </a:solidFill>
+                <a:latin typeface="Consolas"/>
+              </a:rPr>
+              <a:t> </a:t>
             </a:r>
             <a:r>
               <a:rPr lang="en-US" b="1" dirty="0">
@@ -19904,25 +19734,7 @@
                 </a:solidFill>
                 <a:latin typeface="Consolas"/>
               </a:rPr>
-              <a:t>E </a:t>
-            </a:r>
-            <a:r>
-              <a:rPr lang="en-US" b="1" dirty="0" err="1">
-                <a:solidFill>
-                  <a:srgbClr val="000000"/>
-                </a:solidFill>
-                <a:latin typeface="Consolas"/>
-              </a:rPr>
-              <a:t>localitem</a:t>
-            </a:r>
-            <a:r>
-              <a:rPr lang="en-US" b="1" dirty="0">
-                <a:solidFill>
-                  <a:srgbClr val="000000"/>
-                </a:solidFill>
-                <a:latin typeface="Consolas"/>
-              </a:rPr>
-              <a:t> = (E)</a:t>
+              <a:t>(E)</a:t>
             </a:r>
             <a:r>
               <a:rPr lang="en-US" b="1" i="1" dirty="0" err="1">
@@ -19979,111 +19791,13 @@
               <a:t>itemOffset</a:t>
             </a:r>
             <a:r>
-              <a:rPr lang="en-US" b="1" i="1" dirty="0" smtClean="0">
-                <a:solidFill>
-                  <a:srgbClr val="000000"/>
-                </a:solidFill>
-                <a:latin typeface="Consolas"/>
-              </a:rPr>
-              <a:t>);</a:t>
-            </a:r>
-            <a:endParaRPr lang="en-US" b="1" dirty="0" smtClean="0">
-              <a:solidFill>
-                <a:srgbClr val="7F0055"/>
-              </a:solidFill>
-              <a:latin typeface="Consolas"/>
-            </a:endParaRPr>
-          </a:p>
-          <a:p>
-            <a:r>
-              <a:rPr lang="en-US" b="1" dirty="0">
-                <a:solidFill>
-                  <a:srgbClr val="7F0055"/>
-                </a:solidFill>
-                <a:latin typeface="Consolas"/>
-              </a:rPr>
-              <a:t> </a:t>
-            </a:r>
-            <a:r>
-              <a:rPr lang="en-US" b="1" dirty="0" smtClean="0">
-                <a:solidFill>
-                  <a:srgbClr val="7F0055"/>
-                </a:solidFill>
-                <a:latin typeface="Consolas"/>
-              </a:rPr>
-              <a:t>   return</a:t>
-            </a:r>
-            <a:r>
-              <a:rPr lang="en-US" b="1" dirty="0" smtClean="0">
-                <a:solidFill>
-                  <a:srgbClr val="000000"/>
-                </a:solidFill>
-                <a:latin typeface="Consolas"/>
-              </a:rPr>
-              <a:t> (</a:t>
-            </a:r>
-            <a:r>
-              <a:rPr lang="en-US" b="1" dirty="0" err="1" smtClean="0">
-                <a:solidFill>
-                  <a:srgbClr val="000000"/>
-                </a:solidFill>
-                <a:latin typeface="Consolas"/>
-              </a:rPr>
-              <a:t>localitem</a:t>
-            </a:r>
-            <a:r>
-              <a:rPr lang="en-US" b="1" dirty="0" smtClean="0">
-                <a:solidFill>
-                  <a:srgbClr val="000000"/>
-                </a:solidFill>
-                <a:latin typeface="Consolas"/>
-              </a:rPr>
-              <a:t> == </a:t>
-            </a:r>
-            <a:r>
-              <a:rPr lang="en-US" b="1" dirty="0">
-                <a:solidFill>
-                  <a:srgbClr val="7F0055"/>
-                </a:solidFill>
-                <a:latin typeface="Consolas"/>
-              </a:rPr>
-              <a:t>null</a:t>
-            </a:r>
-            <a:r>
-              <a:rPr lang="en-US" b="1" dirty="0" smtClean="0">
-                <a:solidFill>
-                  <a:srgbClr val="000000"/>
-                </a:solidFill>
-                <a:latin typeface="Consolas"/>
-              </a:rPr>
-              <a:t>) ? </a:t>
-            </a:r>
-            <a:r>
-              <a:rPr lang="en-US" b="1" dirty="0">
-                <a:solidFill>
-                  <a:srgbClr val="0000C0"/>
-                </a:solidFill>
-                <a:latin typeface="Consolas"/>
-              </a:rPr>
-              <a:t>item</a:t>
-            </a:r>
-            <a:r>
-              <a:rPr lang="en-US" b="1" dirty="0" smtClean="0">
-                <a:solidFill>
-                  <a:srgbClr val="000000"/>
-                </a:solidFill>
-                <a:latin typeface="Consolas"/>
-              </a:rPr>
-              <a:t> : </a:t>
-            </a:r>
-            <a:r>
-              <a:rPr lang="en-US" b="1" dirty="0" err="1" smtClean="0">
-                <a:solidFill>
-                  <a:srgbClr val="000000"/>
-                </a:solidFill>
-                <a:latin typeface="Consolas"/>
-              </a:rPr>
-              <a:t>localitem</a:t>
+              <a:rPr lang="en-US" b="1" i="1" dirty="0">
+                <a:solidFill>
+                  <a:srgbClr val="000000"/>
+                </a:solidFill>
+                <a:latin typeface="Consolas"/>
+              </a:rPr>
+              <a:t>)</a:t>
             </a:r>
             <a:r>
               <a:rPr lang="en-US" b="1" dirty="0" smtClean="0">
@@ -20111,6 +19825,12 @@
               </a:rPr>
               <a:t>}</a:t>
             </a:r>
+            <a:endParaRPr lang="en-US" dirty="0" smtClean="0">
+              <a:solidFill>
+                <a:srgbClr val="000000"/>
+              </a:solidFill>
+              <a:latin typeface="Consolas"/>
+            </a:endParaRPr>
           </a:p>
           <a:p>
             <a:endParaRPr lang="en-US" dirty="0">
@@ -20166,25 +19886,34 @@
                 </a:solidFill>
                 <a:latin typeface="Consolas"/>
               </a:rPr>
-              <a:t>     </a:t>
+              <a:t>    </a:t>
+            </a:r>
+            <a:r>
+              <a:rPr lang="en-US" b="1" dirty="0" smtClean="0">
+                <a:solidFill>
+                  <a:srgbClr val="7F0055"/>
+                </a:solidFill>
+                <a:latin typeface="Consolas"/>
+              </a:rPr>
+              <a:t>return</a:t>
+            </a:r>
+            <a:r>
+              <a:rPr lang="en-US" b="1" dirty="0" smtClean="0">
+                <a:solidFill>
+                  <a:srgbClr val="000000"/>
+                </a:solidFill>
+                <a:latin typeface="Consolas"/>
+              </a:rPr>
+              <a:t> </a:t>
             </a:r>
             <a:r>
               <a:rPr lang="en-US" b="1" dirty="0">
                 <a:solidFill>
-                  <a:srgbClr val="7F0055"/>
-                </a:solidFill>
-                <a:latin typeface="Consolas"/>
-              </a:rPr>
-              <a:t>return</a:t>
-            </a:r>
-            <a:r>
-              <a:rPr lang="en-US" b="1" dirty="0">
-                <a:solidFill>
-                  <a:srgbClr val="000000"/>
-                </a:solidFill>
-                <a:latin typeface="Consolas"/>
-              </a:rPr>
-              <a:t> (Node&lt;E&gt;)</a:t>
+                  <a:srgbClr val="000000"/>
+                </a:solidFill>
+                <a:latin typeface="Consolas"/>
+              </a:rPr>
+              <a:t>(Node&lt;E&gt;)</a:t>
             </a:r>
             <a:r>
               <a:rPr lang="en-US" b="1" i="1" dirty="0" err="1">

</xml_diff>

<commit_message>
Added back acquire load of item
</commit_message>
<xml_diff>
--- a/Presentations/ConcurrentLinkedQueueRelaxed.pptx
+++ b/Presentations/ConcurrentLinkedQueueRelaxed.pptx
@@ -30,6 +30,8 @@
     <p:sldId id="280" r:id="rId24"/>
     <p:sldId id="281" r:id="rId25"/>
     <p:sldId id="283" r:id="rId26"/>
+    <p:sldId id="284" r:id="rId27"/>
+    <p:sldId id="285" r:id="rId28"/>
   </p:sldIdLst>
   <p:sldSz cx="9144000" cy="6858000" type="screen4x3"/>
   <p:notesSz cx="6858000" cy="9144000"/>
@@ -757,7 +759,7 @@
             <a:fld id="{1D8BD707-D9CF-40AE-B4C6-C98DA3205C09}" type="datetimeFigureOut">
               <a:rPr lang="en-US" smtClean="0"/>
               <a:pPr/>
-              <a:t>11/5/2014</a:t>
+              <a:t>11/7/2014</a:t>
             </a:fld>
             <a:endParaRPr lang="en-US"/>
           </a:p>
@@ -955,7 +957,7 @@
             <a:fld id="{1D8BD707-D9CF-40AE-B4C6-C98DA3205C09}" type="datetimeFigureOut">
               <a:rPr lang="en-US" smtClean="0"/>
               <a:pPr/>
-              <a:t>11/5/2014</a:t>
+              <a:t>11/7/2014</a:t>
             </a:fld>
             <a:endParaRPr lang="en-US"/>
           </a:p>
@@ -1142,7 +1144,7 @@
             <a:fld id="{1D8BD707-D9CF-40AE-B4C6-C98DA3205C09}" type="datetimeFigureOut">
               <a:rPr lang="en-US" smtClean="0"/>
               <a:pPr/>
-              <a:t>11/5/2014</a:t>
+              <a:t>11/7/2014</a:t>
             </a:fld>
             <a:endParaRPr lang="en-US"/>
           </a:p>
@@ -1294,7 +1296,7 @@
             <a:fld id="{1D8BD707-D9CF-40AE-B4C6-C98DA3205C09}" type="datetimeFigureOut">
               <a:rPr lang="en-US" smtClean="0"/>
               <a:pPr/>
-              <a:t>11/5/2014</a:t>
+              <a:t>11/7/2014</a:t>
             </a:fld>
             <a:endParaRPr lang="en-US"/>
           </a:p>
@@ -1551,7 +1553,7 @@
             <a:fld id="{1D8BD707-D9CF-40AE-B4C6-C98DA3205C09}" type="datetimeFigureOut">
               <a:rPr lang="en-US" smtClean="0"/>
               <a:pPr/>
-              <a:t>11/5/2014</a:t>
+              <a:t>11/7/2014</a:t>
             </a:fld>
             <a:endParaRPr lang="en-US"/>
           </a:p>
@@ -1962,7 +1964,7 @@
             <a:fld id="{1D8BD707-D9CF-40AE-B4C6-C98DA3205C09}" type="datetimeFigureOut">
               <a:rPr lang="en-US" smtClean="0"/>
               <a:pPr/>
-              <a:t>11/5/2014</a:t>
+              <a:t>11/7/2014</a:t>
             </a:fld>
             <a:endParaRPr lang="en-US"/>
           </a:p>
@@ -2410,7 +2412,7 @@
             <a:fld id="{1D8BD707-D9CF-40AE-B4C6-C98DA3205C09}" type="datetimeFigureOut">
               <a:rPr lang="en-US" smtClean="0"/>
               <a:pPr/>
-              <a:t>11/5/2014</a:t>
+              <a:t>11/7/2014</a:t>
             </a:fld>
             <a:endParaRPr lang="en-US"/>
           </a:p>
@@ -2513,7 +2515,7 @@
             <a:fld id="{1D8BD707-D9CF-40AE-B4C6-C98DA3205C09}" type="datetimeFigureOut">
               <a:rPr lang="en-US" smtClean="0"/>
               <a:pPr/>
-              <a:t>11/5/2014</a:t>
+              <a:t>11/7/2014</a:t>
             </a:fld>
             <a:endParaRPr lang="en-US"/>
           </a:p>
@@ -2636,7 +2638,7 @@
             <a:fld id="{1D8BD707-D9CF-40AE-B4C6-C98DA3205C09}" type="datetimeFigureOut">
               <a:rPr lang="en-US" smtClean="0"/>
               <a:pPr/>
-              <a:t>11/5/2014</a:t>
+              <a:t>11/7/2014</a:t>
             </a:fld>
             <a:endParaRPr lang="en-US"/>
           </a:p>
@@ -2912,7 +2914,7 @@
             <a:fld id="{1D8BD707-D9CF-40AE-B4C6-C98DA3205C09}" type="datetimeFigureOut">
               <a:rPr lang="en-US" smtClean="0"/>
               <a:pPr/>
-              <a:t>11/5/2014</a:t>
+              <a:t>11/7/2014</a:t>
             </a:fld>
             <a:endParaRPr lang="en-US"/>
           </a:p>
@@ -3119,7 +3121,7 @@
             <a:fld id="{1D8BD707-D9CF-40AE-B4C6-C98DA3205C09}" type="datetimeFigureOut">
               <a:rPr lang="en-US" smtClean="0"/>
               <a:pPr/>
-              <a:t>11/5/2014</a:t>
+              <a:t>11/7/2014</a:t>
             </a:fld>
             <a:endParaRPr lang="en-US"/>
           </a:p>
@@ -4230,7 +4232,7 @@
             <a:fld id="{1D8BD707-D9CF-40AE-B4C6-C98DA3205C09}" type="datetimeFigureOut">
               <a:rPr lang="en-US" smtClean="0"/>
               <a:pPr/>
-              <a:t>11/5/2014</a:t>
+              <a:t>11/7/2014</a:t>
             </a:fld>
             <a:endParaRPr lang="en-US"/>
           </a:p>
@@ -4712,7 +4714,11 @@
           <a:p>
             <a:r>
               <a:rPr lang="en-US" sz="1900" dirty="0" smtClean="0"/>
-              <a:t>October 2014</a:t>
+              <a:t>November </a:t>
+            </a:r>
+            <a:r>
+              <a:rPr lang="en-US" sz="1900" dirty="0" smtClean="0"/>
+              <a:t>2014</a:t>
             </a:r>
             <a:endParaRPr lang="en-US" sz="1900" dirty="0"/>
           </a:p>
@@ -4820,8 +4826,12 @@
               <a:t>, then it means that this node has been logically </a:t>
             </a:r>
             <a:r>
+              <a:rPr lang="en-US" sz="1200" dirty="0"/>
+              <a:t>removed, but under special circumstances, there may be re-ordering of instructions, so we need to check again with an acquire-load that it is really null</a:t>
+            </a:r>
+            <a:r>
               <a:rPr lang="en-US" sz="1200" dirty="0" smtClean="0"/>
-              <a:t>removed;</a:t>
+              <a:t>;</a:t>
             </a:r>
             <a:endParaRPr lang="en-US" sz="1200" dirty="0" smtClean="0"/>
           </a:p>
@@ -5195,11 +5205,7 @@
           <a:p>
             <a:r>
               <a:rPr lang="en-US" sz="1400" dirty="0" smtClean="0"/>
-              <a:t>After a node is logically removed </a:t>
-            </a:r>
-            <a:r>
-              <a:rPr lang="en-US" sz="1400" dirty="0" smtClean="0"/>
-              <a:t>by </a:t>
+              <a:t>After a node is logically removed by </a:t>
             </a:r>
             <a:r>
               <a:rPr lang="en-US" sz="1400" dirty="0" smtClean="0">
@@ -5210,11 +5216,7 @@
             </a:r>
             <a:r>
               <a:rPr lang="en-US" sz="1400" dirty="0" smtClean="0"/>
-              <a:t> from the beginning of the list, </a:t>
-            </a:r>
-            <a:r>
-              <a:rPr lang="en-US" sz="1400" dirty="0" smtClean="0"/>
-              <a:t>to help the GC, in the CLQ we set the </a:t>
+              <a:t> from the beginning of the list, to help the GC, in the CLQ we set the </a:t>
             </a:r>
             <a:r>
               <a:rPr lang="en-US" sz="1400" dirty="0" smtClean="0">
@@ -5225,13 +5227,8 @@
             </a:r>
             <a:r>
               <a:rPr lang="en-US" sz="1400" dirty="0" smtClean="0"/>
-              <a:t> to reference the node itself, and this is the final state, from which there is no further </a:t>
-            </a:r>
-            <a:r>
-              <a:rPr lang="en-US" sz="1400" dirty="0" smtClean="0"/>
-              <a:t>transition.</a:t>
-            </a:r>
-            <a:endParaRPr lang="en-US" sz="1400" dirty="0" smtClean="0"/>
+              <a:t> to reference the node itself, and this is the final state, from which there is no further transition.</a:t>
+            </a:r>
           </a:p>
           <a:p>
             <a:endParaRPr lang="en-US" sz="1400" dirty="0"/>
@@ -9298,15 +9295,7 @@
             <a:pPr lvl="1"/>
             <a:r>
               <a:rPr lang="en-US" sz="1200" dirty="0" smtClean="0"/>
-              <a:t>Items removed through remove()/poll() become logically removed when the value of item is </a:t>
-            </a:r>
-            <a:r>
-              <a:rPr lang="en-US" sz="1200" dirty="0" smtClean="0"/>
-              <a:t>read on </a:t>
-            </a:r>
-            <a:r>
-              <a:rPr lang="en-US" sz="1200" dirty="0" smtClean="0"/>
-              <a:t>line 3 of contains() when </a:t>
+              <a:t>Items removed through remove()/poll() become logically removed when the value of item is read on line 3 of contains() when </a:t>
             </a:r>
             <a:r>
               <a:rPr lang="en-US" sz="1200" dirty="0" err="1">
@@ -9422,12 +9411,16 @@
             </a:r>
             <a:r>
               <a:rPr lang="en-US" sz="1200" dirty="0" smtClean="0"/>
-              <a:t>() returning null, or when the CAS fails on line 7;</a:t>
+              <a:t>() returning null, or when the CAS fails on line 7</a:t>
+            </a:r>
+            <a:r>
+              <a:rPr lang="en-US" sz="1200" dirty="0" smtClean="0"/>
+              <a:t>;</a:t>
             </a:r>
           </a:p>
           <a:p>
             <a:pPr lvl="1"/>
-            <a:endParaRPr lang="en-US" sz="1200" dirty="0"/>
+            <a:endParaRPr lang="en-US" sz="1200" dirty="0" smtClean="0"/>
           </a:p>
         </p:txBody>
       </p:sp>
@@ -9598,8 +9591,21 @@
             </a:r>
             <a:r>
               <a:rPr lang="en-US" sz="1600" dirty="0" smtClean="0"/>
-              <a:t>, and therefore, should not be subject to this kind of issue.</a:t>
-            </a:r>
+              <a:t>, and therefore, should not be subject to this kind of </a:t>
+            </a:r>
+            <a:r>
+              <a:rPr lang="en-US" sz="1600" dirty="0" smtClean="0"/>
+              <a:t>issue (apart from the </a:t>
+            </a:r>
+            <a:r>
+              <a:rPr lang="en-US" sz="1600" dirty="0" smtClean="0"/>
+              <a:t>special case of item being null when read with a relaxed load)</a:t>
+            </a:r>
+            <a:r>
+              <a:rPr lang="en-US" sz="1600" dirty="0" smtClean="0"/>
+              <a:t>.</a:t>
+            </a:r>
+            <a:endParaRPr lang="en-US" sz="1600" dirty="0" smtClean="0"/>
           </a:p>
           <a:p>
             <a:endParaRPr lang="en-US" sz="1600" dirty="0"/>
@@ -17764,6 +17770,1894 @@
 </p:sld>
 </file>
 
+<file path=ppt/slides/slide26.xml><?xml version="1.0" encoding="utf-8"?>
+<p:sld xmlns:a="http://schemas.openxmlformats.org/drawingml/2006/main" xmlns:r="http://schemas.openxmlformats.org/officeDocument/2006/relationships" xmlns:p="http://schemas.openxmlformats.org/presentationml/2006/main">
+  <p:cSld>
+    <p:spTree>
+      <p:nvGrpSpPr>
+        <p:cNvPr id="1" name=""/>
+        <p:cNvGrpSpPr/>
+        <p:nvPr/>
+      </p:nvGrpSpPr>
+      <p:grpSpPr>
+        <a:xfrm>
+          <a:off x="0" y="0"/>
+          <a:ext cx="0" cy="0"/>
+          <a:chOff x="0" y="0"/>
+          <a:chExt cx="0" cy="0"/>
+        </a:xfrm>
+      </p:grpSpPr>
+      <p:sp>
+        <p:nvSpPr>
+          <p:cNvPr id="3" name="Content Placeholder 2"/>
+          <p:cNvSpPr>
+            <a:spLocks noGrp="1"/>
+          </p:cNvSpPr>
+          <p:nvPr>
+            <p:ph idx="1"/>
+          </p:nvPr>
+        </p:nvSpPr>
+        <p:spPr>
+          <a:xfrm>
+            <a:off x="152400" y="1481328"/>
+            <a:ext cx="8763000" cy="1185672"/>
+          </a:xfrm>
+        </p:spPr>
+        <p:txBody>
+          <a:bodyPr>
+            <a:normAutofit/>
+          </a:bodyPr>
+          <a:lstStyle/>
+          <a:p>
+            <a:r>
+              <a:rPr lang="en-US" sz="1600" dirty="0" smtClean="0"/>
+              <a:t>Imagine the following scenario where we start </a:t>
+            </a:r>
+            <a:r>
+              <a:rPr lang="en-US" sz="1600" dirty="0"/>
+              <a:t>with a list which contains item </a:t>
+            </a:r>
+            <a:r>
+              <a:rPr lang="en-US" sz="1600" dirty="0" smtClean="0">
+                <a:latin typeface="Consolas" panose="020B0609020204030204" pitchFamily="49" charset="0"/>
+                <a:cs typeface="Consolas" panose="020B0609020204030204" pitchFamily="49" charset="0"/>
+              </a:rPr>
+              <a:t>Z</a:t>
+            </a:r>
+            <a:r>
+              <a:rPr lang="en-US" sz="1600" dirty="0" smtClean="0"/>
+              <a:t> and there </a:t>
+            </a:r>
+            <a:r>
+              <a:rPr lang="en-US" sz="1600" dirty="0"/>
+              <a:t>is a volatile variable that is modified before the </a:t>
+            </a:r>
+            <a:r>
+              <a:rPr lang="en-US" sz="1600" dirty="0">
+                <a:latin typeface="Consolas" panose="020B0609020204030204" pitchFamily="49" charset="0"/>
+                <a:cs typeface="Consolas" panose="020B0609020204030204" pitchFamily="49" charset="0"/>
+              </a:rPr>
+              <a:t>remove(Z)</a:t>
+            </a:r>
+            <a:r>
+              <a:rPr lang="en-US" sz="1600" dirty="0"/>
+              <a:t> operation is </a:t>
+            </a:r>
+            <a:r>
+              <a:rPr lang="en-US" sz="1600" dirty="0" smtClean="0"/>
+              <a:t>done (this implies not just sequentially consistency but an happens-before relationship).</a:t>
+            </a:r>
+            <a:endParaRPr lang="en-US" sz="1600" dirty="0"/>
+          </a:p>
+          <a:p>
+            <a:endParaRPr lang="en-US" sz="1600" dirty="0"/>
+          </a:p>
+        </p:txBody>
+      </p:sp>
+      <p:sp>
+        <p:nvSpPr>
+          <p:cNvPr id="2" name="Title 1"/>
+          <p:cNvSpPr>
+            <a:spLocks noGrp="1"/>
+          </p:cNvSpPr>
+          <p:nvPr>
+            <p:ph type="title"/>
+          </p:nvPr>
+        </p:nvSpPr>
+        <p:spPr/>
+        <p:txBody>
+          <a:bodyPr>
+            <a:normAutofit fontScale="90000"/>
+          </a:bodyPr>
+          <a:lstStyle/>
+          <a:p>
+            <a:r>
+              <a:rPr lang="en-US" dirty="0" smtClean="0"/>
+              <a:t>Why do we need an acquire-load when </a:t>
+            </a:r>
+            <a:r>
+              <a:rPr lang="en-US" dirty="0" smtClean="0">
+                <a:latin typeface="Consolas" panose="020B0609020204030204" pitchFamily="49" charset="0"/>
+                <a:cs typeface="Consolas" panose="020B0609020204030204" pitchFamily="49" charset="0"/>
+              </a:rPr>
+              <a:t>item</a:t>
+            </a:r>
+            <a:r>
+              <a:rPr lang="en-US" dirty="0" smtClean="0"/>
+              <a:t> is null?                  (1/2)</a:t>
+            </a:r>
+            <a:endParaRPr lang="en-US" dirty="0"/>
+          </a:p>
+        </p:txBody>
+      </p:sp>
+      <p:sp>
+        <p:nvSpPr>
+          <p:cNvPr id="4" name="TextBox 3"/>
+          <p:cNvSpPr txBox="1"/>
+          <p:nvPr/>
+        </p:nvSpPr>
+        <p:spPr>
+          <a:xfrm>
+            <a:off x="685800" y="2362200"/>
+            <a:ext cx="5791200" cy="2677656"/>
+          </a:xfrm>
+          <a:prstGeom prst="rect">
+            <a:avLst/>
+          </a:prstGeom>
+          <a:noFill/>
+        </p:spPr>
+        <p:txBody>
+          <a:bodyPr wrap="square" rtlCol="0">
+            <a:spAutoFit/>
+          </a:bodyPr>
+          <a:lstStyle/>
+          <a:p>
+            <a:r>
+              <a:rPr lang="en-US" sz="1400" dirty="0">
+                <a:latin typeface="Consolas" panose="020B0609020204030204" pitchFamily="49" charset="0"/>
+                <a:cs typeface="Consolas" panose="020B0609020204030204" pitchFamily="49" charset="0"/>
+              </a:rPr>
+              <a:t>volatile </a:t>
+            </a:r>
+            <a:r>
+              <a:rPr lang="en-US" sz="1400" dirty="0" err="1">
+                <a:latin typeface="Consolas" panose="020B0609020204030204" pitchFamily="49" charset="0"/>
+                <a:cs typeface="Consolas" panose="020B0609020204030204" pitchFamily="49" charset="0"/>
+              </a:rPr>
+              <a:t>bool</a:t>
+            </a:r>
+            <a:r>
+              <a:rPr lang="en-US" sz="1400" dirty="0">
+                <a:latin typeface="Consolas" panose="020B0609020204030204" pitchFamily="49" charset="0"/>
+                <a:cs typeface="Consolas" panose="020B0609020204030204" pitchFamily="49" charset="0"/>
+              </a:rPr>
+              <a:t> </a:t>
+            </a:r>
+            <a:r>
+              <a:rPr lang="en-US" sz="1400" dirty="0" err="1">
+                <a:latin typeface="Consolas" panose="020B0609020204030204" pitchFamily="49" charset="0"/>
+                <a:cs typeface="Consolas" panose="020B0609020204030204" pitchFamily="49" charset="0"/>
+              </a:rPr>
+              <a:t>beforeZRemoval</a:t>
+            </a:r>
+            <a:r>
+              <a:rPr lang="en-US" sz="1400" dirty="0">
+                <a:latin typeface="Consolas" panose="020B0609020204030204" pitchFamily="49" charset="0"/>
+                <a:cs typeface="Consolas" panose="020B0609020204030204" pitchFamily="49" charset="0"/>
+              </a:rPr>
+              <a:t> = false;</a:t>
+            </a:r>
+          </a:p>
+          <a:p>
+            <a:r>
+              <a:rPr lang="en-US" sz="1400" dirty="0">
+                <a:latin typeface="Consolas" panose="020B0609020204030204" pitchFamily="49" charset="0"/>
+                <a:cs typeface="Consolas" panose="020B0609020204030204" pitchFamily="49" charset="0"/>
+              </a:rPr>
+              <a:t/>
+            </a:r>
+            <a:br>
+              <a:rPr lang="en-US" sz="1400" dirty="0">
+                <a:latin typeface="Consolas" panose="020B0609020204030204" pitchFamily="49" charset="0"/>
+                <a:cs typeface="Consolas" panose="020B0609020204030204" pitchFamily="49" charset="0"/>
+              </a:rPr>
+            </a:br>
+            <a:endParaRPr lang="en-US" sz="1400" dirty="0">
+              <a:latin typeface="Consolas" panose="020B0609020204030204" pitchFamily="49" charset="0"/>
+              <a:cs typeface="Consolas" panose="020B0609020204030204" pitchFamily="49" charset="0"/>
+            </a:endParaRPr>
+          </a:p>
+          <a:p>
+            <a:r>
+              <a:rPr lang="en-US" sz="1400" dirty="0">
+                <a:latin typeface="Consolas" panose="020B0609020204030204" pitchFamily="49" charset="0"/>
+                <a:cs typeface="Consolas" panose="020B0609020204030204" pitchFamily="49" charset="0"/>
+              </a:rPr>
+              <a:t>Thread 1:</a:t>
+            </a:r>
+          </a:p>
+          <a:p>
+            <a:r>
+              <a:rPr lang="en-US" sz="1400" dirty="0" smtClean="0">
+                <a:latin typeface="Consolas" panose="020B0609020204030204" pitchFamily="49" charset="0"/>
+                <a:cs typeface="Consolas" panose="020B0609020204030204" pitchFamily="49" charset="0"/>
+              </a:rPr>
+              <a:t>    </a:t>
+            </a:r>
+            <a:r>
+              <a:rPr lang="en-US" sz="1400" dirty="0" err="1" smtClean="0">
+                <a:latin typeface="Consolas" panose="020B0609020204030204" pitchFamily="49" charset="0"/>
+                <a:cs typeface="Consolas" panose="020B0609020204030204" pitchFamily="49" charset="0"/>
+              </a:rPr>
+              <a:t>beforeZRemoval</a:t>
+            </a:r>
+            <a:r>
+              <a:rPr lang="en-US" sz="1400" dirty="0" smtClean="0">
+                <a:latin typeface="Consolas" panose="020B0609020204030204" pitchFamily="49" charset="0"/>
+                <a:cs typeface="Consolas" panose="020B0609020204030204" pitchFamily="49" charset="0"/>
+              </a:rPr>
+              <a:t> </a:t>
+            </a:r>
+            <a:r>
+              <a:rPr lang="en-US" sz="1400" dirty="0">
+                <a:latin typeface="Consolas" panose="020B0609020204030204" pitchFamily="49" charset="0"/>
+                <a:cs typeface="Consolas" panose="020B0609020204030204" pitchFamily="49" charset="0"/>
+              </a:rPr>
+              <a:t>= true;</a:t>
+            </a:r>
+          </a:p>
+          <a:p>
+            <a:r>
+              <a:rPr lang="en-US" sz="1400" dirty="0" smtClean="0">
+                <a:latin typeface="Consolas" panose="020B0609020204030204" pitchFamily="49" charset="0"/>
+                <a:cs typeface="Consolas" panose="020B0609020204030204" pitchFamily="49" charset="0"/>
+              </a:rPr>
+              <a:t>    </a:t>
+            </a:r>
+            <a:r>
+              <a:rPr lang="en-US" sz="1400" dirty="0" err="1" smtClean="0">
+                <a:latin typeface="Consolas" panose="020B0609020204030204" pitchFamily="49" charset="0"/>
+                <a:cs typeface="Consolas" panose="020B0609020204030204" pitchFamily="49" charset="0"/>
+              </a:rPr>
+              <a:t>list.remove</a:t>
+            </a:r>
+            <a:r>
+              <a:rPr lang="en-US" sz="1400" dirty="0" smtClean="0">
+                <a:latin typeface="Consolas" panose="020B0609020204030204" pitchFamily="49" charset="0"/>
+                <a:cs typeface="Consolas" panose="020B0609020204030204" pitchFamily="49" charset="0"/>
+              </a:rPr>
+              <a:t>(Z</a:t>
+            </a:r>
+            <a:r>
+              <a:rPr lang="en-US" sz="1400" dirty="0">
+                <a:latin typeface="Consolas" panose="020B0609020204030204" pitchFamily="49" charset="0"/>
+                <a:cs typeface="Consolas" panose="020B0609020204030204" pitchFamily="49" charset="0"/>
+              </a:rPr>
+              <a:t>);</a:t>
+            </a:r>
+          </a:p>
+          <a:p>
+            <a:r>
+              <a:rPr lang="en-US" sz="1400" dirty="0">
+                <a:latin typeface="Consolas" panose="020B0609020204030204" pitchFamily="49" charset="0"/>
+                <a:cs typeface="Consolas" panose="020B0609020204030204" pitchFamily="49" charset="0"/>
+              </a:rPr>
+              <a:t/>
+            </a:r>
+            <a:br>
+              <a:rPr lang="en-US" sz="1400" dirty="0">
+                <a:latin typeface="Consolas" panose="020B0609020204030204" pitchFamily="49" charset="0"/>
+                <a:cs typeface="Consolas" panose="020B0609020204030204" pitchFamily="49" charset="0"/>
+              </a:rPr>
+            </a:br>
+            <a:endParaRPr lang="en-US" sz="1400" dirty="0">
+              <a:latin typeface="Consolas" panose="020B0609020204030204" pitchFamily="49" charset="0"/>
+              <a:cs typeface="Consolas" panose="020B0609020204030204" pitchFamily="49" charset="0"/>
+            </a:endParaRPr>
+          </a:p>
+          <a:p>
+            <a:r>
+              <a:rPr lang="en-US" sz="1400" dirty="0">
+                <a:latin typeface="Consolas" panose="020B0609020204030204" pitchFamily="49" charset="0"/>
+                <a:cs typeface="Consolas" panose="020B0609020204030204" pitchFamily="49" charset="0"/>
+              </a:rPr>
+              <a:t>Thread 2:</a:t>
+            </a:r>
+          </a:p>
+          <a:p>
+            <a:r>
+              <a:rPr lang="en-US" sz="1400" dirty="0" smtClean="0">
+                <a:latin typeface="Consolas" panose="020B0609020204030204" pitchFamily="49" charset="0"/>
+                <a:cs typeface="Consolas" panose="020B0609020204030204" pitchFamily="49" charset="0"/>
+              </a:rPr>
+              <a:t>    </a:t>
+            </a:r>
+            <a:r>
+              <a:rPr lang="en-US" sz="1400" dirty="0" err="1" smtClean="0">
+                <a:latin typeface="Consolas" panose="020B0609020204030204" pitchFamily="49" charset="0"/>
+                <a:cs typeface="Consolas" panose="020B0609020204030204" pitchFamily="49" charset="0"/>
+              </a:rPr>
+              <a:t>bool</a:t>
+            </a:r>
+            <a:r>
+              <a:rPr lang="en-US" sz="1400" dirty="0" smtClean="0">
+                <a:latin typeface="Consolas" panose="020B0609020204030204" pitchFamily="49" charset="0"/>
+                <a:cs typeface="Consolas" panose="020B0609020204030204" pitchFamily="49" charset="0"/>
+              </a:rPr>
+              <a:t> </a:t>
+            </a:r>
+            <a:r>
+              <a:rPr lang="en-US" sz="1400" dirty="0" err="1">
+                <a:latin typeface="Consolas" panose="020B0609020204030204" pitchFamily="49" charset="0"/>
+                <a:cs typeface="Consolas" panose="020B0609020204030204" pitchFamily="49" charset="0"/>
+              </a:rPr>
+              <a:t>lz</a:t>
+            </a:r>
+            <a:r>
+              <a:rPr lang="en-US" sz="1400" dirty="0">
+                <a:latin typeface="Consolas" panose="020B0609020204030204" pitchFamily="49" charset="0"/>
+                <a:cs typeface="Consolas" panose="020B0609020204030204" pitchFamily="49" charset="0"/>
+              </a:rPr>
+              <a:t> = </a:t>
+            </a:r>
+            <a:r>
+              <a:rPr lang="en-US" sz="1400" dirty="0" err="1">
+                <a:latin typeface="Consolas" panose="020B0609020204030204" pitchFamily="49" charset="0"/>
+                <a:cs typeface="Consolas" panose="020B0609020204030204" pitchFamily="49" charset="0"/>
+              </a:rPr>
+              <a:t>list.contains</a:t>
+            </a:r>
+            <a:r>
+              <a:rPr lang="en-US" sz="1400" dirty="0">
+                <a:latin typeface="Consolas" panose="020B0609020204030204" pitchFamily="49" charset="0"/>
+                <a:cs typeface="Consolas" panose="020B0609020204030204" pitchFamily="49" charset="0"/>
+              </a:rPr>
+              <a:t>(Z);</a:t>
+            </a:r>
+          </a:p>
+          <a:p>
+            <a:r>
+              <a:rPr lang="en-US" sz="1400" dirty="0" smtClean="0">
+                <a:latin typeface="Consolas" panose="020B0609020204030204" pitchFamily="49" charset="0"/>
+                <a:cs typeface="Consolas" panose="020B0609020204030204" pitchFamily="49" charset="0"/>
+              </a:rPr>
+              <a:t>    </a:t>
+            </a:r>
+            <a:r>
+              <a:rPr lang="en-US" sz="1400" dirty="0" err="1" smtClean="0">
+                <a:latin typeface="Consolas" panose="020B0609020204030204" pitchFamily="49" charset="0"/>
+                <a:cs typeface="Consolas" panose="020B0609020204030204" pitchFamily="49" charset="0"/>
+              </a:rPr>
+              <a:t>bool</a:t>
+            </a:r>
+            <a:r>
+              <a:rPr lang="en-US" sz="1400" dirty="0" smtClean="0">
+                <a:latin typeface="Consolas" panose="020B0609020204030204" pitchFamily="49" charset="0"/>
+                <a:cs typeface="Consolas" panose="020B0609020204030204" pitchFamily="49" charset="0"/>
+              </a:rPr>
+              <a:t> </a:t>
+            </a:r>
+            <a:r>
+              <a:rPr lang="en-US" sz="1400" dirty="0" err="1">
+                <a:latin typeface="Consolas" panose="020B0609020204030204" pitchFamily="49" charset="0"/>
+                <a:cs typeface="Consolas" panose="020B0609020204030204" pitchFamily="49" charset="0"/>
+              </a:rPr>
+              <a:t>lb</a:t>
+            </a:r>
+            <a:r>
+              <a:rPr lang="en-US" sz="1400" dirty="0">
+                <a:latin typeface="Consolas" panose="020B0609020204030204" pitchFamily="49" charset="0"/>
+                <a:cs typeface="Consolas" panose="020B0609020204030204" pitchFamily="49" charset="0"/>
+              </a:rPr>
+              <a:t> = </a:t>
+            </a:r>
+            <a:r>
+              <a:rPr lang="en-US" sz="1400" dirty="0" err="1">
+                <a:latin typeface="Consolas" panose="020B0609020204030204" pitchFamily="49" charset="0"/>
+                <a:cs typeface="Consolas" panose="020B0609020204030204" pitchFamily="49" charset="0"/>
+              </a:rPr>
+              <a:t>beforeZRemoval</a:t>
+            </a:r>
+            <a:r>
+              <a:rPr lang="en-US" sz="1400" dirty="0">
+                <a:latin typeface="Consolas" panose="020B0609020204030204" pitchFamily="49" charset="0"/>
+                <a:cs typeface="Consolas" panose="020B0609020204030204" pitchFamily="49" charset="0"/>
+              </a:rPr>
+              <a:t>;</a:t>
+            </a:r>
+          </a:p>
+          <a:p>
+            <a:endParaRPr lang="en-US" sz="1400" dirty="0">
+              <a:latin typeface="Consolas" panose="020B0609020204030204" pitchFamily="49" charset="0"/>
+              <a:cs typeface="Consolas" panose="020B0609020204030204" pitchFamily="49" charset="0"/>
+            </a:endParaRPr>
+          </a:p>
+        </p:txBody>
+      </p:sp>
+      <p:sp>
+        <p:nvSpPr>
+          <p:cNvPr id="5" name="Content Placeholder 2"/>
+          <p:cNvSpPr txBox="1">
+            <a:spLocks/>
+          </p:cNvSpPr>
+          <p:nvPr/>
+        </p:nvSpPr>
+        <p:spPr>
+          <a:xfrm>
+            <a:off x="152400" y="4876800"/>
+            <a:ext cx="8763000" cy="1600200"/>
+          </a:xfrm>
+          <a:prstGeom prst="rect">
+            <a:avLst/>
+          </a:prstGeom>
+        </p:spPr>
+        <p:txBody>
+          <a:bodyPr vert="horz">
+            <a:normAutofit/>
+          </a:bodyPr>
+          <a:lstStyle>
+            <a:lvl1pPr marL="365760" indent="-256032" algn="l" rtl="0" eaLnBrk="1" latinLnBrk="0" hangingPunct="1">
+              <a:spcBef>
+                <a:spcPts val="400"/>
+              </a:spcBef>
+              <a:spcAft>
+                <a:spcPts val="0"/>
+              </a:spcAft>
+              <a:buClr>
+                <a:schemeClr val="accent1"/>
+              </a:buClr>
+              <a:buSzPct val="68000"/>
+              <a:buFont typeface="Wingdings 3"/>
+              <a:buChar char=""/>
+              <a:defRPr kumimoji="0" sz="2700" kern="1200">
+                <a:solidFill>
+                  <a:schemeClr val="tx1"/>
+                </a:solidFill>
+                <a:latin typeface="+mn-lt"/>
+                <a:ea typeface="+mn-ea"/>
+                <a:cs typeface="+mn-cs"/>
+              </a:defRPr>
+            </a:lvl1pPr>
+            <a:lvl2pPr marL="621792" indent="-228600" algn="l" rtl="0" eaLnBrk="1" latinLnBrk="0" hangingPunct="1">
+              <a:spcBef>
+                <a:spcPts val="324"/>
+              </a:spcBef>
+              <a:buClr>
+                <a:schemeClr val="accent1"/>
+              </a:buClr>
+              <a:buFont typeface="Verdana"/>
+              <a:buChar char="◦"/>
+              <a:defRPr kumimoji="0" sz="2300" kern="1200">
+                <a:solidFill>
+                  <a:schemeClr val="tx1"/>
+                </a:solidFill>
+                <a:latin typeface="+mn-lt"/>
+                <a:ea typeface="+mn-ea"/>
+                <a:cs typeface="+mn-cs"/>
+              </a:defRPr>
+            </a:lvl2pPr>
+            <a:lvl3pPr marL="859536" indent="-228600" algn="l" rtl="0" eaLnBrk="1" latinLnBrk="0" hangingPunct="1">
+              <a:spcBef>
+                <a:spcPts val="350"/>
+              </a:spcBef>
+              <a:buClr>
+                <a:schemeClr val="accent2"/>
+              </a:buClr>
+              <a:buSzPct val="100000"/>
+              <a:buFont typeface="Wingdings 2"/>
+              <a:buChar char=""/>
+              <a:defRPr kumimoji="0" sz="2100" kern="1200">
+                <a:solidFill>
+                  <a:schemeClr val="tx1"/>
+                </a:solidFill>
+                <a:latin typeface="+mn-lt"/>
+                <a:ea typeface="+mn-ea"/>
+                <a:cs typeface="+mn-cs"/>
+              </a:defRPr>
+            </a:lvl3pPr>
+            <a:lvl4pPr marL="1143000" indent="-228600" algn="l" rtl="0" eaLnBrk="1" latinLnBrk="0" hangingPunct="1">
+              <a:spcBef>
+                <a:spcPts val="350"/>
+              </a:spcBef>
+              <a:buClr>
+                <a:schemeClr val="accent2"/>
+              </a:buClr>
+              <a:buFont typeface="Wingdings 2"/>
+              <a:buChar char=""/>
+              <a:defRPr kumimoji="0" sz="1900" kern="1200">
+                <a:solidFill>
+                  <a:schemeClr val="tx1"/>
+                </a:solidFill>
+                <a:latin typeface="+mn-lt"/>
+                <a:ea typeface="+mn-ea"/>
+                <a:cs typeface="+mn-cs"/>
+              </a:defRPr>
+            </a:lvl4pPr>
+            <a:lvl5pPr marL="1371600" indent="-228600" algn="l" rtl="0" eaLnBrk="1" latinLnBrk="0" hangingPunct="1">
+              <a:spcBef>
+                <a:spcPts val="350"/>
+              </a:spcBef>
+              <a:buClr>
+                <a:schemeClr val="accent2"/>
+              </a:buClr>
+              <a:buFont typeface="Wingdings 2"/>
+              <a:buChar char=""/>
+              <a:defRPr kumimoji="0" sz="1800" kern="1200">
+                <a:solidFill>
+                  <a:schemeClr val="tx1"/>
+                </a:solidFill>
+                <a:latin typeface="+mn-lt"/>
+                <a:ea typeface="+mn-ea"/>
+                <a:cs typeface="+mn-cs"/>
+              </a:defRPr>
+            </a:lvl5pPr>
+            <a:lvl6pPr marL="1600200" indent="-228600" algn="l" rtl="0" eaLnBrk="1" latinLnBrk="0" hangingPunct="1">
+              <a:spcBef>
+                <a:spcPts val="350"/>
+              </a:spcBef>
+              <a:buClr>
+                <a:schemeClr val="accent3"/>
+              </a:buClr>
+              <a:buFont typeface="Wingdings 2"/>
+              <a:buChar char=""/>
+              <a:defRPr kumimoji="0" sz="1800" kern="1200">
+                <a:solidFill>
+                  <a:schemeClr val="tx1"/>
+                </a:solidFill>
+                <a:latin typeface="+mn-lt"/>
+                <a:ea typeface="+mn-ea"/>
+                <a:cs typeface="+mn-cs"/>
+              </a:defRPr>
+            </a:lvl6pPr>
+            <a:lvl7pPr marL="1828800" indent="-228600" algn="l" rtl="0" eaLnBrk="1" latinLnBrk="0" hangingPunct="1">
+              <a:spcBef>
+                <a:spcPts val="350"/>
+              </a:spcBef>
+              <a:buClr>
+                <a:schemeClr val="accent3"/>
+              </a:buClr>
+              <a:buFont typeface="Wingdings 2"/>
+              <a:buChar char=""/>
+              <a:defRPr kumimoji="0" sz="1600" kern="1200">
+                <a:solidFill>
+                  <a:schemeClr val="tx1"/>
+                </a:solidFill>
+                <a:latin typeface="+mn-lt"/>
+                <a:ea typeface="+mn-ea"/>
+                <a:cs typeface="+mn-cs"/>
+              </a:defRPr>
+            </a:lvl7pPr>
+            <a:lvl8pPr marL="2057400" indent="-228600" algn="l" rtl="0" eaLnBrk="1" latinLnBrk="0" hangingPunct="1">
+              <a:spcBef>
+                <a:spcPts val="350"/>
+              </a:spcBef>
+              <a:buClr>
+                <a:schemeClr val="accent3"/>
+              </a:buClr>
+              <a:buFont typeface="Wingdings 2"/>
+              <a:buChar char=""/>
+              <a:defRPr kumimoji="0" sz="1600" kern="1200">
+                <a:solidFill>
+                  <a:schemeClr val="tx1"/>
+                </a:solidFill>
+                <a:latin typeface="+mn-lt"/>
+                <a:ea typeface="+mn-ea"/>
+                <a:cs typeface="+mn-cs"/>
+              </a:defRPr>
+            </a:lvl8pPr>
+            <a:lvl9pPr marL="2286000" indent="-228600" algn="l" rtl="0" eaLnBrk="1" latinLnBrk="0" hangingPunct="1">
+              <a:spcBef>
+                <a:spcPts val="350"/>
+              </a:spcBef>
+              <a:buClr>
+                <a:schemeClr val="accent3"/>
+              </a:buClr>
+              <a:buFont typeface="Wingdings 2"/>
+              <a:buChar char=""/>
+              <a:defRPr kumimoji="0" sz="1600" kern="1200" baseline="0">
+                <a:solidFill>
+                  <a:schemeClr val="tx1"/>
+                </a:solidFill>
+                <a:latin typeface="+mn-lt"/>
+                <a:ea typeface="+mn-ea"/>
+                <a:cs typeface="+mn-cs"/>
+              </a:defRPr>
+            </a:lvl9pPr>
+            <a:extLst/>
+          </a:lstStyle>
+          <a:p>
+            <a:pPr marL="109728" indent="0">
+              <a:buNone/>
+            </a:pPr>
+            <a:r>
+              <a:rPr lang="en-US" sz="1200" dirty="0"/>
+              <a:t>If the removal is sequentially consistent (with atomics) then Thread 2 would be able to observe only the following states for </a:t>
+            </a:r>
+            <a:r>
+              <a:rPr lang="en-US" sz="1200" dirty="0" err="1"/>
+              <a:t>lz</a:t>
+            </a:r>
+            <a:r>
+              <a:rPr lang="en-US" sz="1200" dirty="0"/>
+              <a:t> and </a:t>
+            </a:r>
+            <a:r>
+              <a:rPr lang="en-US" sz="1200" dirty="0" err="1"/>
+              <a:t>lb</a:t>
+            </a:r>
+            <a:r>
+              <a:rPr lang="en-US" sz="1200" dirty="0"/>
+              <a:t>:</a:t>
+            </a:r>
+          </a:p>
+          <a:p>
+            <a:pPr marL="109728" indent="0">
+              <a:buNone/>
+            </a:pPr>
+            <a:r>
+              <a:rPr lang="en-US" sz="1200" dirty="0" err="1">
+                <a:latin typeface="Consolas" panose="020B0609020204030204" pitchFamily="49" charset="0"/>
+                <a:cs typeface="Consolas" panose="020B0609020204030204" pitchFamily="49" charset="0"/>
+              </a:rPr>
+              <a:t>lz</a:t>
+            </a:r>
+            <a:r>
+              <a:rPr lang="en-US" sz="1200" dirty="0">
+                <a:latin typeface="Consolas" panose="020B0609020204030204" pitchFamily="49" charset="0"/>
+                <a:cs typeface="Consolas" panose="020B0609020204030204" pitchFamily="49" charset="0"/>
+              </a:rPr>
+              <a:t> = true, </a:t>
+            </a:r>
+            <a:r>
+              <a:rPr lang="en-US" sz="1200" dirty="0" err="1">
+                <a:latin typeface="Consolas" panose="020B0609020204030204" pitchFamily="49" charset="0"/>
+                <a:cs typeface="Consolas" panose="020B0609020204030204" pitchFamily="49" charset="0"/>
+              </a:rPr>
+              <a:t>lb</a:t>
+            </a:r>
+            <a:r>
+              <a:rPr lang="en-US" sz="1200" dirty="0">
+                <a:latin typeface="Consolas" panose="020B0609020204030204" pitchFamily="49" charset="0"/>
+                <a:cs typeface="Consolas" panose="020B0609020204030204" pitchFamily="49" charset="0"/>
+              </a:rPr>
+              <a:t> = false</a:t>
+            </a:r>
+            <a:r>
+              <a:rPr lang="en-US" sz="1200" dirty="0"/>
+              <a:t>;   // Z is in the list and </a:t>
+            </a:r>
+            <a:r>
+              <a:rPr lang="en-US" sz="1200" dirty="0" err="1">
+                <a:latin typeface="Consolas" panose="020B0609020204030204" pitchFamily="49" charset="0"/>
+                <a:cs typeface="Consolas" panose="020B0609020204030204" pitchFamily="49" charset="0"/>
+              </a:rPr>
+              <a:t>beforeZRemoval</a:t>
+            </a:r>
+            <a:r>
+              <a:rPr lang="en-US" sz="1200" dirty="0"/>
+              <a:t> has not yet been toggled</a:t>
+            </a:r>
+          </a:p>
+          <a:p>
+            <a:pPr marL="109728" indent="0">
+              <a:buNone/>
+            </a:pPr>
+            <a:r>
+              <a:rPr lang="en-US" sz="1200" dirty="0" err="1">
+                <a:latin typeface="Consolas" panose="020B0609020204030204" pitchFamily="49" charset="0"/>
+                <a:cs typeface="Consolas" panose="020B0609020204030204" pitchFamily="49" charset="0"/>
+              </a:rPr>
+              <a:t>lz</a:t>
+            </a:r>
+            <a:r>
+              <a:rPr lang="en-US" sz="1200" dirty="0">
+                <a:latin typeface="Consolas" panose="020B0609020204030204" pitchFamily="49" charset="0"/>
+                <a:cs typeface="Consolas" panose="020B0609020204030204" pitchFamily="49" charset="0"/>
+              </a:rPr>
+              <a:t> = true, </a:t>
+            </a:r>
+            <a:r>
+              <a:rPr lang="en-US" sz="1200" dirty="0" err="1">
+                <a:latin typeface="Consolas" panose="020B0609020204030204" pitchFamily="49" charset="0"/>
+                <a:cs typeface="Consolas" panose="020B0609020204030204" pitchFamily="49" charset="0"/>
+              </a:rPr>
+              <a:t>lb</a:t>
+            </a:r>
+            <a:r>
+              <a:rPr lang="en-US" sz="1200" dirty="0">
+                <a:latin typeface="Consolas" panose="020B0609020204030204" pitchFamily="49" charset="0"/>
+                <a:cs typeface="Consolas" panose="020B0609020204030204" pitchFamily="49" charset="0"/>
+              </a:rPr>
+              <a:t> = true; </a:t>
+            </a:r>
+            <a:r>
+              <a:rPr lang="en-US" sz="1200" dirty="0"/>
+              <a:t>   // Z is in the list and </a:t>
+            </a:r>
+            <a:r>
+              <a:rPr lang="en-US" sz="1200" dirty="0" err="1">
+                <a:latin typeface="Consolas" panose="020B0609020204030204" pitchFamily="49" charset="0"/>
+                <a:cs typeface="Consolas" panose="020B0609020204030204" pitchFamily="49" charset="0"/>
+              </a:rPr>
+              <a:t>beforeZRemoval</a:t>
+            </a:r>
+            <a:r>
+              <a:rPr lang="en-US" sz="1200" dirty="0"/>
+              <a:t> has already been toggled to true</a:t>
+            </a:r>
+          </a:p>
+          <a:p>
+            <a:pPr marL="109728" indent="0">
+              <a:buNone/>
+            </a:pPr>
+            <a:r>
+              <a:rPr lang="en-US" sz="1200" dirty="0" err="1">
+                <a:latin typeface="Consolas" panose="020B0609020204030204" pitchFamily="49" charset="0"/>
+                <a:cs typeface="Consolas" panose="020B0609020204030204" pitchFamily="49" charset="0"/>
+              </a:rPr>
+              <a:t>lz</a:t>
+            </a:r>
+            <a:r>
+              <a:rPr lang="en-US" sz="1200" dirty="0">
+                <a:latin typeface="Consolas" panose="020B0609020204030204" pitchFamily="49" charset="0"/>
+                <a:cs typeface="Consolas" panose="020B0609020204030204" pitchFamily="49" charset="0"/>
+              </a:rPr>
+              <a:t> = false, </a:t>
+            </a:r>
+            <a:r>
+              <a:rPr lang="en-US" sz="1200" dirty="0" err="1">
+                <a:latin typeface="Consolas" panose="020B0609020204030204" pitchFamily="49" charset="0"/>
+                <a:cs typeface="Consolas" panose="020B0609020204030204" pitchFamily="49" charset="0"/>
+              </a:rPr>
+              <a:t>lb</a:t>
+            </a:r>
+            <a:r>
+              <a:rPr lang="en-US" sz="1200" dirty="0">
+                <a:latin typeface="Consolas" panose="020B0609020204030204" pitchFamily="49" charset="0"/>
+                <a:cs typeface="Consolas" panose="020B0609020204030204" pitchFamily="49" charset="0"/>
+              </a:rPr>
+              <a:t> = true; </a:t>
+            </a:r>
+            <a:r>
+              <a:rPr lang="en-US" sz="1200" dirty="0"/>
+              <a:t>  // Z is no longer in the list and </a:t>
+            </a:r>
+            <a:r>
+              <a:rPr lang="en-US" sz="1200" dirty="0" err="1">
+                <a:latin typeface="Consolas" panose="020B0609020204030204" pitchFamily="49" charset="0"/>
+                <a:cs typeface="Consolas" panose="020B0609020204030204" pitchFamily="49" charset="0"/>
+              </a:rPr>
+              <a:t>beforeZRemoval</a:t>
+            </a:r>
+            <a:r>
+              <a:rPr lang="en-US" sz="1200" dirty="0"/>
+              <a:t> has already been toggled to true</a:t>
+            </a:r>
+          </a:p>
+        </p:txBody>
+      </p:sp>
+    </p:spTree>
+    <p:extLst>
+      <p:ext uri="{BB962C8B-B14F-4D97-AF65-F5344CB8AC3E}">
+        <p14:creationId xmlns:p14="http://schemas.microsoft.com/office/powerpoint/2010/main" val="2289976079"/>
+      </p:ext>
+    </p:extLst>
+  </p:cSld>
+  <p:clrMapOvr>
+    <a:masterClrMapping/>
+  </p:clrMapOvr>
+  <p:timing>
+    <p:tnLst>
+      <p:par>
+        <p:cTn id="1" dur="indefinite" restart="never" nodeType="tmRoot"/>
+      </p:par>
+    </p:tnLst>
+  </p:timing>
+</p:sld>
+</file>
+
+<file path=ppt/slides/slide27.xml><?xml version="1.0" encoding="utf-8"?>
+<p:sld xmlns:a="http://schemas.openxmlformats.org/drawingml/2006/main" xmlns:r="http://schemas.openxmlformats.org/officeDocument/2006/relationships" xmlns:p="http://schemas.openxmlformats.org/presentationml/2006/main">
+  <p:cSld>
+    <p:spTree>
+      <p:nvGrpSpPr>
+        <p:cNvPr id="1" name=""/>
+        <p:cNvGrpSpPr/>
+        <p:nvPr/>
+      </p:nvGrpSpPr>
+      <p:grpSpPr>
+        <a:xfrm>
+          <a:off x="0" y="0"/>
+          <a:ext cx="0" cy="0"/>
+          <a:chOff x="0" y="0"/>
+          <a:chExt cx="0" cy="0"/>
+        </a:xfrm>
+      </p:grpSpPr>
+      <p:sp>
+        <p:nvSpPr>
+          <p:cNvPr id="3" name="Content Placeholder 2"/>
+          <p:cNvSpPr>
+            <a:spLocks noGrp="1"/>
+          </p:cNvSpPr>
+          <p:nvPr>
+            <p:ph idx="1"/>
+          </p:nvPr>
+        </p:nvSpPr>
+        <p:spPr>
+          <a:xfrm>
+            <a:off x="152400" y="1481328"/>
+            <a:ext cx="8763000" cy="957072"/>
+          </a:xfrm>
+        </p:spPr>
+        <p:txBody>
+          <a:bodyPr>
+            <a:normAutofit/>
+          </a:bodyPr>
+          <a:lstStyle/>
+          <a:p>
+            <a:r>
+              <a:rPr lang="en-US" sz="1600" dirty="0"/>
+              <a:t>The problem is if we use a relaxed load on the </a:t>
+            </a:r>
+            <a:r>
+              <a:rPr lang="en-US" sz="1600" dirty="0">
+                <a:latin typeface="Consolas" panose="020B0609020204030204" pitchFamily="49" charset="0"/>
+                <a:cs typeface="Consolas" panose="020B0609020204030204" pitchFamily="49" charset="0"/>
+              </a:rPr>
+              <a:t>item</a:t>
+            </a:r>
+            <a:r>
+              <a:rPr lang="en-US" sz="1600" dirty="0"/>
+              <a:t>, it can "travel" to below the load of </a:t>
+            </a:r>
+            <a:r>
+              <a:rPr lang="en-US" sz="1600" dirty="0" err="1">
+                <a:latin typeface="Consolas" panose="020B0609020204030204" pitchFamily="49" charset="0"/>
+                <a:cs typeface="Consolas" panose="020B0609020204030204" pitchFamily="49" charset="0"/>
+              </a:rPr>
+              <a:t>beforeZRemoval</a:t>
+            </a:r>
+            <a:r>
+              <a:rPr lang="en-US" sz="1600" dirty="0"/>
+              <a:t> and give rise to an unexpected </a:t>
+            </a:r>
+            <a:r>
+              <a:rPr lang="en-US" sz="1600" dirty="0" smtClean="0"/>
+              <a:t>state (non </a:t>
+            </a:r>
+            <a:r>
+              <a:rPr lang="en-US" sz="1600" dirty="0"/>
+              <a:t>sequentially consistent</a:t>
+            </a:r>
+            <a:r>
+              <a:rPr lang="en-US" sz="1600" dirty="0" smtClean="0"/>
+              <a:t>). </a:t>
+            </a:r>
+            <a:r>
+              <a:rPr lang="en-US" sz="1600" dirty="0"/>
+              <a:t>The flow is like </a:t>
+            </a:r>
+            <a:r>
+              <a:rPr lang="en-US" sz="1600" dirty="0" smtClean="0"/>
+              <a:t>this, from top to bottom:</a:t>
+            </a:r>
+            <a:endParaRPr lang="en-US" sz="1600" dirty="0"/>
+          </a:p>
+        </p:txBody>
+      </p:sp>
+      <p:sp>
+        <p:nvSpPr>
+          <p:cNvPr id="2" name="Title 1"/>
+          <p:cNvSpPr>
+            <a:spLocks noGrp="1"/>
+          </p:cNvSpPr>
+          <p:nvPr>
+            <p:ph type="title"/>
+          </p:nvPr>
+        </p:nvSpPr>
+        <p:spPr/>
+        <p:txBody>
+          <a:bodyPr>
+            <a:normAutofit fontScale="90000"/>
+          </a:bodyPr>
+          <a:lstStyle/>
+          <a:p>
+            <a:r>
+              <a:rPr lang="en-US" dirty="0" smtClean="0"/>
+              <a:t>Why do we need an acquire-load when </a:t>
+            </a:r>
+            <a:r>
+              <a:rPr lang="en-US" dirty="0" smtClean="0">
+                <a:latin typeface="Consolas" panose="020B0609020204030204" pitchFamily="49" charset="0"/>
+                <a:cs typeface="Consolas" panose="020B0609020204030204" pitchFamily="49" charset="0"/>
+              </a:rPr>
+              <a:t>item</a:t>
+            </a:r>
+            <a:r>
+              <a:rPr lang="en-US" dirty="0" smtClean="0"/>
+              <a:t> is null?                  (2/2)</a:t>
+            </a:r>
+            <a:endParaRPr lang="en-US" dirty="0"/>
+          </a:p>
+        </p:txBody>
+      </p:sp>
+      <p:sp>
+        <p:nvSpPr>
+          <p:cNvPr id="5" name="Content Placeholder 2"/>
+          <p:cNvSpPr txBox="1">
+            <a:spLocks/>
+          </p:cNvSpPr>
+          <p:nvPr/>
+        </p:nvSpPr>
+        <p:spPr>
+          <a:xfrm>
+            <a:off x="152400" y="5410200"/>
+            <a:ext cx="8763000" cy="1066800"/>
+          </a:xfrm>
+          <a:prstGeom prst="rect">
+            <a:avLst/>
+          </a:prstGeom>
+        </p:spPr>
+        <p:txBody>
+          <a:bodyPr vert="horz">
+            <a:normAutofit/>
+          </a:bodyPr>
+          <a:lstStyle>
+            <a:lvl1pPr marL="365760" indent="-256032" algn="l" rtl="0" eaLnBrk="1" latinLnBrk="0" hangingPunct="1">
+              <a:spcBef>
+                <a:spcPts val="400"/>
+              </a:spcBef>
+              <a:spcAft>
+                <a:spcPts val="0"/>
+              </a:spcAft>
+              <a:buClr>
+                <a:schemeClr val="accent1"/>
+              </a:buClr>
+              <a:buSzPct val="68000"/>
+              <a:buFont typeface="Wingdings 3"/>
+              <a:buChar char=""/>
+              <a:defRPr kumimoji="0" sz="2700" kern="1200">
+                <a:solidFill>
+                  <a:schemeClr val="tx1"/>
+                </a:solidFill>
+                <a:latin typeface="+mn-lt"/>
+                <a:ea typeface="+mn-ea"/>
+                <a:cs typeface="+mn-cs"/>
+              </a:defRPr>
+            </a:lvl1pPr>
+            <a:lvl2pPr marL="621792" indent="-228600" algn="l" rtl="0" eaLnBrk="1" latinLnBrk="0" hangingPunct="1">
+              <a:spcBef>
+                <a:spcPts val="324"/>
+              </a:spcBef>
+              <a:buClr>
+                <a:schemeClr val="accent1"/>
+              </a:buClr>
+              <a:buFont typeface="Verdana"/>
+              <a:buChar char="◦"/>
+              <a:defRPr kumimoji="0" sz="2300" kern="1200">
+                <a:solidFill>
+                  <a:schemeClr val="tx1"/>
+                </a:solidFill>
+                <a:latin typeface="+mn-lt"/>
+                <a:ea typeface="+mn-ea"/>
+                <a:cs typeface="+mn-cs"/>
+              </a:defRPr>
+            </a:lvl2pPr>
+            <a:lvl3pPr marL="859536" indent="-228600" algn="l" rtl="0" eaLnBrk="1" latinLnBrk="0" hangingPunct="1">
+              <a:spcBef>
+                <a:spcPts val="350"/>
+              </a:spcBef>
+              <a:buClr>
+                <a:schemeClr val="accent2"/>
+              </a:buClr>
+              <a:buSzPct val="100000"/>
+              <a:buFont typeface="Wingdings 2"/>
+              <a:buChar char=""/>
+              <a:defRPr kumimoji="0" sz="2100" kern="1200">
+                <a:solidFill>
+                  <a:schemeClr val="tx1"/>
+                </a:solidFill>
+                <a:latin typeface="+mn-lt"/>
+                <a:ea typeface="+mn-ea"/>
+                <a:cs typeface="+mn-cs"/>
+              </a:defRPr>
+            </a:lvl3pPr>
+            <a:lvl4pPr marL="1143000" indent="-228600" algn="l" rtl="0" eaLnBrk="1" latinLnBrk="0" hangingPunct="1">
+              <a:spcBef>
+                <a:spcPts val="350"/>
+              </a:spcBef>
+              <a:buClr>
+                <a:schemeClr val="accent2"/>
+              </a:buClr>
+              <a:buFont typeface="Wingdings 2"/>
+              <a:buChar char=""/>
+              <a:defRPr kumimoji="0" sz="1900" kern="1200">
+                <a:solidFill>
+                  <a:schemeClr val="tx1"/>
+                </a:solidFill>
+                <a:latin typeface="+mn-lt"/>
+                <a:ea typeface="+mn-ea"/>
+                <a:cs typeface="+mn-cs"/>
+              </a:defRPr>
+            </a:lvl4pPr>
+            <a:lvl5pPr marL="1371600" indent="-228600" algn="l" rtl="0" eaLnBrk="1" latinLnBrk="0" hangingPunct="1">
+              <a:spcBef>
+                <a:spcPts val="350"/>
+              </a:spcBef>
+              <a:buClr>
+                <a:schemeClr val="accent2"/>
+              </a:buClr>
+              <a:buFont typeface="Wingdings 2"/>
+              <a:buChar char=""/>
+              <a:defRPr kumimoji="0" sz="1800" kern="1200">
+                <a:solidFill>
+                  <a:schemeClr val="tx1"/>
+                </a:solidFill>
+                <a:latin typeface="+mn-lt"/>
+                <a:ea typeface="+mn-ea"/>
+                <a:cs typeface="+mn-cs"/>
+              </a:defRPr>
+            </a:lvl5pPr>
+            <a:lvl6pPr marL="1600200" indent="-228600" algn="l" rtl="0" eaLnBrk="1" latinLnBrk="0" hangingPunct="1">
+              <a:spcBef>
+                <a:spcPts val="350"/>
+              </a:spcBef>
+              <a:buClr>
+                <a:schemeClr val="accent3"/>
+              </a:buClr>
+              <a:buFont typeface="Wingdings 2"/>
+              <a:buChar char=""/>
+              <a:defRPr kumimoji="0" sz="1800" kern="1200">
+                <a:solidFill>
+                  <a:schemeClr val="tx1"/>
+                </a:solidFill>
+                <a:latin typeface="+mn-lt"/>
+                <a:ea typeface="+mn-ea"/>
+                <a:cs typeface="+mn-cs"/>
+              </a:defRPr>
+            </a:lvl6pPr>
+            <a:lvl7pPr marL="1828800" indent="-228600" algn="l" rtl="0" eaLnBrk="1" latinLnBrk="0" hangingPunct="1">
+              <a:spcBef>
+                <a:spcPts val="350"/>
+              </a:spcBef>
+              <a:buClr>
+                <a:schemeClr val="accent3"/>
+              </a:buClr>
+              <a:buFont typeface="Wingdings 2"/>
+              <a:buChar char=""/>
+              <a:defRPr kumimoji="0" sz="1600" kern="1200">
+                <a:solidFill>
+                  <a:schemeClr val="tx1"/>
+                </a:solidFill>
+                <a:latin typeface="+mn-lt"/>
+                <a:ea typeface="+mn-ea"/>
+                <a:cs typeface="+mn-cs"/>
+              </a:defRPr>
+            </a:lvl7pPr>
+            <a:lvl8pPr marL="2057400" indent="-228600" algn="l" rtl="0" eaLnBrk="1" latinLnBrk="0" hangingPunct="1">
+              <a:spcBef>
+                <a:spcPts val="350"/>
+              </a:spcBef>
+              <a:buClr>
+                <a:schemeClr val="accent3"/>
+              </a:buClr>
+              <a:buFont typeface="Wingdings 2"/>
+              <a:buChar char=""/>
+              <a:defRPr kumimoji="0" sz="1600" kern="1200">
+                <a:solidFill>
+                  <a:schemeClr val="tx1"/>
+                </a:solidFill>
+                <a:latin typeface="+mn-lt"/>
+                <a:ea typeface="+mn-ea"/>
+                <a:cs typeface="+mn-cs"/>
+              </a:defRPr>
+            </a:lvl8pPr>
+            <a:lvl9pPr marL="2286000" indent="-228600" algn="l" rtl="0" eaLnBrk="1" latinLnBrk="0" hangingPunct="1">
+              <a:spcBef>
+                <a:spcPts val="350"/>
+              </a:spcBef>
+              <a:buClr>
+                <a:schemeClr val="accent3"/>
+              </a:buClr>
+              <a:buFont typeface="Wingdings 2"/>
+              <a:buChar char=""/>
+              <a:defRPr kumimoji="0" sz="1600" kern="1200" baseline="0">
+                <a:solidFill>
+                  <a:schemeClr val="tx1"/>
+                </a:solidFill>
+                <a:latin typeface="+mn-lt"/>
+                <a:ea typeface="+mn-ea"/>
+                <a:cs typeface="+mn-cs"/>
+              </a:defRPr>
+            </a:lvl9pPr>
+            <a:extLst/>
+          </a:lstStyle>
+          <a:p>
+            <a:pPr marL="109728" indent="0">
+              <a:buNone/>
+            </a:pPr>
+            <a:r>
+              <a:rPr lang="en-US" sz="1200" dirty="0"/>
+              <a:t>The state </a:t>
+            </a:r>
+            <a:r>
+              <a:rPr lang="en-US" sz="1200" dirty="0" err="1">
+                <a:latin typeface="Consolas" panose="020B0609020204030204" pitchFamily="49" charset="0"/>
+                <a:cs typeface="Consolas" panose="020B0609020204030204" pitchFamily="49" charset="0"/>
+              </a:rPr>
+              <a:t>lb</a:t>
+            </a:r>
+            <a:r>
+              <a:rPr lang="en-US" sz="1200" dirty="0">
+                <a:latin typeface="Consolas" panose="020B0609020204030204" pitchFamily="49" charset="0"/>
+                <a:cs typeface="Consolas" panose="020B0609020204030204" pitchFamily="49" charset="0"/>
+              </a:rPr>
+              <a:t> = </a:t>
+            </a:r>
+            <a:r>
+              <a:rPr lang="en-US" sz="1200" b="1" dirty="0">
+                <a:latin typeface="Consolas" panose="020B0609020204030204" pitchFamily="49" charset="0"/>
+                <a:cs typeface="Consolas" panose="020B0609020204030204" pitchFamily="49" charset="0"/>
+              </a:rPr>
+              <a:t>false</a:t>
+            </a:r>
+            <a:r>
+              <a:rPr lang="en-US" sz="1200" dirty="0">
+                <a:latin typeface="Consolas" panose="020B0609020204030204" pitchFamily="49" charset="0"/>
+                <a:cs typeface="Consolas" panose="020B0609020204030204" pitchFamily="49" charset="0"/>
+              </a:rPr>
+              <a:t> </a:t>
+            </a:r>
+            <a:r>
+              <a:rPr lang="en-US" sz="1200" dirty="0">
+                <a:cs typeface="Consolas" panose="020B0609020204030204" pitchFamily="49" charset="0"/>
+              </a:rPr>
+              <a:t>and</a:t>
+            </a:r>
+            <a:r>
+              <a:rPr lang="en-US" sz="1200" dirty="0">
+                <a:latin typeface="Consolas" panose="020B0609020204030204" pitchFamily="49" charset="0"/>
+                <a:cs typeface="Consolas" panose="020B0609020204030204" pitchFamily="49" charset="0"/>
+              </a:rPr>
+              <a:t> </a:t>
+            </a:r>
+            <a:r>
+              <a:rPr lang="en-US" sz="1200" dirty="0" err="1">
+                <a:latin typeface="Consolas" panose="020B0609020204030204" pitchFamily="49" charset="0"/>
+                <a:cs typeface="Consolas" panose="020B0609020204030204" pitchFamily="49" charset="0"/>
+              </a:rPr>
+              <a:t>lz</a:t>
+            </a:r>
+            <a:r>
+              <a:rPr lang="en-US" sz="1200" dirty="0">
+                <a:latin typeface="Consolas" panose="020B0609020204030204" pitchFamily="49" charset="0"/>
+                <a:cs typeface="Consolas" panose="020B0609020204030204" pitchFamily="49" charset="0"/>
+              </a:rPr>
+              <a:t> = </a:t>
+            </a:r>
+            <a:r>
+              <a:rPr lang="en-US" sz="1200" b="1" dirty="0">
+                <a:latin typeface="Consolas" panose="020B0609020204030204" pitchFamily="49" charset="0"/>
+                <a:cs typeface="Consolas" panose="020B0609020204030204" pitchFamily="49" charset="0"/>
+              </a:rPr>
+              <a:t>false</a:t>
+            </a:r>
+            <a:r>
+              <a:rPr lang="en-US" sz="1200" dirty="0">
+                <a:latin typeface="Consolas" panose="020B0609020204030204" pitchFamily="49" charset="0"/>
+                <a:cs typeface="Consolas" panose="020B0609020204030204" pitchFamily="49" charset="0"/>
+              </a:rPr>
+              <a:t> </a:t>
+            </a:r>
+            <a:r>
+              <a:rPr lang="en-US" sz="1200" dirty="0"/>
+              <a:t>is not sequentially consistent</a:t>
+            </a:r>
+            <a:r>
+              <a:rPr lang="en-US" sz="1200" dirty="0" smtClean="0"/>
+              <a:t>.</a:t>
+            </a:r>
+            <a:endParaRPr lang="en-US" sz="1200" dirty="0"/>
+          </a:p>
+        </p:txBody>
+      </p:sp>
+      <p:graphicFrame>
+        <p:nvGraphicFramePr>
+          <p:cNvPr id="6" name="Table 5"/>
+          <p:cNvGraphicFramePr>
+            <a:graphicFrameLocks noGrp="1"/>
+          </p:cNvGraphicFramePr>
+          <p:nvPr>
+            <p:extLst>
+              <p:ext uri="{D42A27DB-BD31-4B8C-83A1-F6EECF244321}">
+                <p14:modId xmlns:p14="http://schemas.microsoft.com/office/powerpoint/2010/main" val="953953792"/>
+              </p:ext>
+            </p:extLst>
+          </p:nvPr>
+        </p:nvGraphicFramePr>
+        <p:xfrm>
+          <a:off x="152400" y="2303554"/>
+          <a:ext cx="8915400" cy="2854960"/>
+        </p:xfrm>
+        <a:graphic>
+          <a:graphicData uri="http://schemas.openxmlformats.org/drawingml/2006/table">
+            <a:tbl>
+              <a:tblPr firstRow="1" bandRow="1">
+                <a:tableStyleId>{5C22544A-7EE6-4342-B048-85BDC9FD1C3A}</a:tableStyleId>
+              </a:tblPr>
+              <a:tblGrid>
+                <a:gridCol w="2286000"/>
+                <a:gridCol w="6629400"/>
+              </a:tblGrid>
+              <a:tr h="370840">
+                <a:tc>
+                  <a:txBody>
+                    <a:bodyPr/>
+                    <a:lstStyle/>
+                    <a:p>
+                      <a:r>
+                        <a:rPr lang="en-US" dirty="0" smtClean="0"/>
+                        <a:t>Thread 1</a:t>
+                      </a:r>
+                      <a:endParaRPr lang="en-US" dirty="0"/>
+                    </a:p>
+                  </a:txBody>
+                  <a:tcPr/>
+                </a:tc>
+                <a:tc>
+                  <a:txBody>
+                    <a:bodyPr/>
+                    <a:lstStyle/>
+                    <a:p>
+                      <a:r>
+                        <a:rPr lang="en-US" dirty="0" smtClean="0"/>
+                        <a:t>Thread 2</a:t>
+                      </a:r>
+                      <a:endParaRPr lang="en-US" dirty="0"/>
+                    </a:p>
+                  </a:txBody>
+                  <a:tcPr/>
+                </a:tc>
+              </a:tr>
+              <a:tr h="370840">
+                <a:tc>
+                  <a:txBody>
+                    <a:bodyPr/>
+                    <a:lstStyle/>
+                    <a:p>
+                      <a:endParaRPr lang="en-US" sz="1200" dirty="0"/>
+                    </a:p>
+                  </a:txBody>
+                  <a:tcPr/>
+                </a:tc>
+                <a:tc>
+                  <a:txBody>
+                    <a:bodyPr/>
+                    <a:lstStyle/>
+                    <a:p>
+                      <a:pPr marL="0" marR="0" indent="0" algn="l" defTabSz="914400" rtl="0" eaLnBrk="1" fontAlgn="auto" latinLnBrk="0" hangingPunct="1">
+                        <a:lnSpc>
+                          <a:spcPct val="100000"/>
+                        </a:lnSpc>
+                        <a:spcBef>
+                          <a:spcPts val="0"/>
+                        </a:spcBef>
+                        <a:spcAft>
+                          <a:spcPts val="0"/>
+                        </a:spcAft>
+                        <a:buClrTx/>
+                        <a:buSzTx/>
+                        <a:buFontTx/>
+                        <a:buNone/>
+                        <a:tabLst/>
+                        <a:defRPr/>
+                      </a:pPr>
+                      <a:r>
+                        <a:rPr kumimoji="0" lang="en-US" sz="1200" b="0" i="0" kern="1200" dirty="0" smtClean="0">
+                          <a:solidFill>
+                            <a:schemeClr val="dk1"/>
+                          </a:solidFill>
+                          <a:effectLst/>
+                          <a:latin typeface="+mn-lt"/>
+                          <a:ea typeface="+mn-ea"/>
+                          <a:cs typeface="+mn-cs"/>
+                        </a:rPr>
+                        <a:t>1. Inside </a:t>
+                      </a:r>
+                      <a:r>
+                        <a:rPr kumimoji="0" lang="en-US" sz="1200" b="0" i="0" kern="1200" dirty="0" err="1" smtClean="0">
+                          <a:solidFill>
+                            <a:schemeClr val="dk1"/>
+                          </a:solidFill>
+                          <a:effectLst/>
+                          <a:latin typeface="Consolas" panose="020B0609020204030204" pitchFamily="49" charset="0"/>
+                          <a:ea typeface="+mn-ea"/>
+                          <a:cs typeface="Consolas" panose="020B0609020204030204" pitchFamily="49" charset="0"/>
+                        </a:rPr>
+                        <a:t>list.contains</a:t>
+                      </a:r>
+                      <a:r>
+                        <a:rPr kumimoji="0" lang="en-US" sz="1200" b="0" i="0" kern="1200" dirty="0" smtClean="0">
+                          <a:solidFill>
+                            <a:schemeClr val="dk1"/>
+                          </a:solidFill>
+                          <a:effectLst/>
+                          <a:latin typeface="Consolas" panose="020B0609020204030204" pitchFamily="49" charset="0"/>
+                          <a:ea typeface="+mn-ea"/>
+                          <a:cs typeface="Consolas" panose="020B0609020204030204" pitchFamily="49" charset="0"/>
+                        </a:rPr>
+                        <a:t>(Z)</a:t>
+                      </a:r>
+                      <a:r>
+                        <a:rPr kumimoji="0" lang="en-US" sz="1200" b="0" i="0" kern="1200" dirty="0" smtClean="0">
+                          <a:solidFill>
+                            <a:schemeClr val="dk1"/>
+                          </a:solidFill>
+                          <a:effectLst/>
+                          <a:latin typeface="+mn-lt"/>
+                          <a:ea typeface="+mn-ea"/>
+                          <a:cs typeface="+mn-cs"/>
+                        </a:rPr>
+                        <a:t> there is a relaxed load of '</a:t>
+                      </a:r>
+                      <a:r>
+                        <a:rPr kumimoji="0" lang="en-US" sz="1200" b="0" i="0" kern="1200" dirty="0" smtClean="0">
+                          <a:solidFill>
+                            <a:schemeClr val="dk1"/>
+                          </a:solidFill>
+                          <a:effectLst/>
+                          <a:latin typeface="Consolas" panose="020B0609020204030204" pitchFamily="49" charset="0"/>
+                          <a:ea typeface="+mn-ea"/>
+                          <a:cs typeface="Consolas" panose="020B0609020204030204" pitchFamily="49" charset="0"/>
+                        </a:rPr>
+                        <a:t>item</a:t>
+                      </a:r>
+                      <a:r>
+                        <a:rPr kumimoji="0" lang="en-US" sz="1200" b="0" i="0" kern="1200" dirty="0" smtClean="0">
+                          <a:solidFill>
+                            <a:schemeClr val="dk1"/>
+                          </a:solidFill>
+                          <a:effectLst/>
+                          <a:latin typeface="+mn-lt"/>
+                          <a:ea typeface="+mn-ea"/>
+                          <a:cs typeface="+mn-cs"/>
+                        </a:rPr>
+                        <a:t>' which is speculated to be null (due to a cache miss) when in fact it is still Z</a:t>
+                      </a:r>
+                      <a:endParaRPr lang="en-US" sz="1200" dirty="0" smtClean="0"/>
+                    </a:p>
+                  </a:txBody>
+                  <a:tcPr/>
+                </a:tc>
+              </a:tr>
+              <a:tr h="370840">
+                <a:tc>
+                  <a:txBody>
+                    <a:bodyPr/>
+                    <a:lstStyle/>
+                    <a:p>
+                      <a:endParaRPr lang="en-US" sz="1200" dirty="0"/>
+                    </a:p>
+                  </a:txBody>
+                  <a:tcPr/>
+                </a:tc>
+                <a:tc>
+                  <a:txBody>
+                    <a:bodyPr/>
+                    <a:lstStyle/>
+                    <a:p>
+                      <a:pPr marL="0" marR="0" indent="0" algn="l" defTabSz="914400" rtl="0" eaLnBrk="1" fontAlgn="auto" latinLnBrk="0" hangingPunct="1">
+                        <a:lnSpc>
+                          <a:spcPct val="100000"/>
+                        </a:lnSpc>
+                        <a:spcBef>
+                          <a:spcPts val="0"/>
+                        </a:spcBef>
+                        <a:spcAft>
+                          <a:spcPts val="0"/>
+                        </a:spcAft>
+                        <a:buClrTx/>
+                        <a:buSzTx/>
+                        <a:buFontTx/>
+                        <a:buNone/>
+                        <a:tabLst/>
+                        <a:defRPr/>
+                      </a:pPr>
+                      <a:r>
+                        <a:rPr kumimoji="0" lang="en-US" sz="1200" b="0" i="0" kern="1200" dirty="0" smtClean="0">
+                          <a:solidFill>
+                            <a:schemeClr val="dk1"/>
+                          </a:solidFill>
+                          <a:effectLst/>
+                          <a:latin typeface="+mn-lt"/>
+                          <a:ea typeface="+mn-ea"/>
+                          <a:cs typeface="+mn-cs"/>
+                        </a:rPr>
+                        <a:t>2. The list is traversed until the end and Z is not found. A volatile load is done on the '</a:t>
+                      </a:r>
+                      <a:r>
+                        <a:rPr kumimoji="0" lang="en-US" sz="1200" b="0" i="0" kern="1200" dirty="0" smtClean="0">
+                          <a:solidFill>
+                            <a:schemeClr val="dk1"/>
+                          </a:solidFill>
+                          <a:effectLst/>
+                          <a:latin typeface="Consolas" panose="020B0609020204030204" pitchFamily="49" charset="0"/>
+                          <a:ea typeface="+mn-ea"/>
+                          <a:cs typeface="Consolas" panose="020B0609020204030204" pitchFamily="49" charset="0"/>
+                        </a:rPr>
+                        <a:t>next</a:t>
+                      </a:r>
+                      <a:r>
+                        <a:rPr kumimoji="0" lang="en-US" sz="1200" b="0" i="0" kern="1200" dirty="0" smtClean="0">
+                          <a:solidFill>
+                            <a:schemeClr val="dk1"/>
+                          </a:solidFill>
+                          <a:effectLst/>
+                          <a:latin typeface="+mn-lt"/>
+                          <a:ea typeface="+mn-ea"/>
+                          <a:cs typeface="+mn-cs"/>
+                        </a:rPr>
+                        <a:t>' of the last node</a:t>
+                      </a:r>
+                      <a:endParaRPr lang="en-US" sz="1200" dirty="0" smtClean="0"/>
+                    </a:p>
+                  </a:txBody>
+                  <a:tcPr/>
+                </a:tc>
+              </a:tr>
+              <a:tr h="370840">
+                <a:tc>
+                  <a:txBody>
+                    <a:bodyPr/>
+                    <a:lstStyle/>
+                    <a:p>
+                      <a:endParaRPr lang="en-US" sz="1200" dirty="0"/>
+                    </a:p>
+                  </a:txBody>
+                  <a:tcPr/>
+                </a:tc>
+                <a:tc>
+                  <a:txBody>
+                    <a:bodyPr/>
+                    <a:lstStyle/>
+                    <a:p>
+                      <a:pPr marL="0" marR="0" indent="0" algn="l" defTabSz="914400" rtl="0" eaLnBrk="1" fontAlgn="auto" latinLnBrk="0" hangingPunct="1">
+                        <a:lnSpc>
+                          <a:spcPct val="100000"/>
+                        </a:lnSpc>
+                        <a:spcBef>
+                          <a:spcPts val="0"/>
+                        </a:spcBef>
+                        <a:spcAft>
+                          <a:spcPts val="0"/>
+                        </a:spcAft>
+                        <a:buClrTx/>
+                        <a:buSzTx/>
+                        <a:buFontTx/>
+                        <a:buNone/>
+                        <a:tabLst/>
+                        <a:defRPr/>
+                      </a:pPr>
+                      <a:r>
+                        <a:rPr kumimoji="0" lang="en-US" sz="1200" b="0" i="0" kern="1200" dirty="0" smtClean="0">
+                          <a:solidFill>
+                            <a:schemeClr val="dk1"/>
+                          </a:solidFill>
+                          <a:effectLst/>
+                          <a:latin typeface="+mn-lt"/>
+                          <a:ea typeface="+mn-ea"/>
+                          <a:cs typeface="+mn-cs"/>
+                        </a:rPr>
+                        <a:t>3. </a:t>
+                      </a:r>
+                      <a:r>
+                        <a:rPr kumimoji="0" lang="en-US" sz="1200" b="0" i="0" kern="1200" dirty="0" err="1" smtClean="0">
+                          <a:solidFill>
+                            <a:schemeClr val="dk1"/>
+                          </a:solidFill>
+                          <a:effectLst/>
+                          <a:latin typeface="Consolas" panose="020B0609020204030204" pitchFamily="49" charset="0"/>
+                          <a:ea typeface="+mn-ea"/>
+                          <a:cs typeface="Consolas" panose="020B0609020204030204" pitchFamily="49" charset="0"/>
+                        </a:rPr>
+                        <a:t>bool</a:t>
+                      </a:r>
+                      <a:r>
+                        <a:rPr kumimoji="0" lang="en-US" sz="1200" b="0" i="0" kern="1200" dirty="0" smtClean="0">
+                          <a:solidFill>
+                            <a:schemeClr val="dk1"/>
+                          </a:solidFill>
+                          <a:effectLst/>
+                          <a:latin typeface="Consolas" panose="020B0609020204030204" pitchFamily="49" charset="0"/>
+                          <a:ea typeface="+mn-ea"/>
+                          <a:cs typeface="Consolas" panose="020B0609020204030204" pitchFamily="49" charset="0"/>
+                        </a:rPr>
+                        <a:t> </a:t>
+                      </a:r>
+                      <a:r>
+                        <a:rPr kumimoji="0" lang="en-US" sz="1200" b="0" i="0" kern="1200" dirty="0" err="1" smtClean="0">
+                          <a:solidFill>
+                            <a:schemeClr val="dk1"/>
+                          </a:solidFill>
+                          <a:effectLst/>
+                          <a:latin typeface="Consolas" panose="020B0609020204030204" pitchFamily="49" charset="0"/>
+                          <a:ea typeface="+mn-ea"/>
+                          <a:cs typeface="Consolas" panose="020B0609020204030204" pitchFamily="49" charset="0"/>
+                        </a:rPr>
+                        <a:t>lb</a:t>
+                      </a:r>
+                      <a:r>
+                        <a:rPr kumimoji="0" lang="en-US" sz="1200" b="0" i="0" kern="1200" dirty="0" smtClean="0">
+                          <a:solidFill>
+                            <a:schemeClr val="dk1"/>
+                          </a:solidFill>
+                          <a:effectLst/>
+                          <a:latin typeface="Consolas" panose="020B0609020204030204" pitchFamily="49" charset="0"/>
+                          <a:ea typeface="+mn-ea"/>
+                          <a:cs typeface="Consolas" panose="020B0609020204030204" pitchFamily="49" charset="0"/>
+                        </a:rPr>
+                        <a:t> = </a:t>
+                      </a:r>
+                      <a:r>
+                        <a:rPr kumimoji="0" lang="en-US" sz="1200" b="0" i="0" kern="1200" dirty="0" err="1" smtClean="0">
+                          <a:solidFill>
+                            <a:schemeClr val="dk1"/>
+                          </a:solidFill>
+                          <a:effectLst/>
+                          <a:latin typeface="Consolas" panose="020B0609020204030204" pitchFamily="49" charset="0"/>
+                          <a:ea typeface="+mn-ea"/>
+                          <a:cs typeface="Consolas" panose="020B0609020204030204" pitchFamily="49" charset="0"/>
+                        </a:rPr>
+                        <a:t>beforeZRemoval</a:t>
+                      </a:r>
+                      <a:r>
+                        <a:rPr kumimoji="0" lang="en-US" sz="1200" b="0" i="0" kern="1200" dirty="0" smtClean="0">
+                          <a:solidFill>
+                            <a:schemeClr val="dk1"/>
+                          </a:solidFill>
+                          <a:effectLst/>
+                          <a:latin typeface="Consolas" panose="020B0609020204030204" pitchFamily="49" charset="0"/>
+                          <a:ea typeface="+mn-ea"/>
+                          <a:cs typeface="Consolas" panose="020B0609020204030204" pitchFamily="49" charset="0"/>
+                        </a:rPr>
+                        <a:t>; </a:t>
+                      </a:r>
+                      <a:r>
+                        <a:rPr kumimoji="0" lang="en-US" sz="1200" b="0" i="0" kern="1200" dirty="0" smtClean="0">
+                          <a:solidFill>
+                            <a:schemeClr val="dk1"/>
+                          </a:solidFill>
+                          <a:effectLst/>
+                          <a:latin typeface="+mn-lt"/>
+                          <a:ea typeface="+mn-ea"/>
+                          <a:cs typeface="+mn-cs"/>
+                        </a:rPr>
+                        <a:t> // This means </a:t>
+                      </a:r>
+                      <a:r>
+                        <a:rPr kumimoji="0" lang="en-US" sz="1200" b="0" i="0" kern="1200" dirty="0" err="1" smtClean="0">
+                          <a:solidFill>
+                            <a:schemeClr val="dk1"/>
+                          </a:solidFill>
+                          <a:effectLst/>
+                          <a:latin typeface="+mn-lt"/>
+                          <a:ea typeface="+mn-ea"/>
+                          <a:cs typeface="+mn-cs"/>
+                        </a:rPr>
+                        <a:t>lb</a:t>
+                      </a:r>
+                      <a:r>
+                        <a:rPr kumimoji="0" lang="en-US" sz="1200" b="0" i="0" kern="1200" dirty="0" smtClean="0">
+                          <a:solidFill>
+                            <a:schemeClr val="dk1"/>
+                          </a:solidFill>
+                          <a:effectLst/>
+                          <a:latin typeface="+mn-lt"/>
+                          <a:ea typeface="+mn-ea"/>
+                          <a:cs typeface="+mn-cs"/>
+                        </a:rPr>
+                        <a:t> = false</a:t>
+                      </a:r>
+                      <a:endParaRPr lang="en-US" sz="1200" dirty="0" smtClean="0"/>
+                    </a:p>
+                  </a:txBody>
+                  <a:tcPr/>
+                </a:tc>
+              </a:tr>
+              <a:tr h="370840">
+                <a:tc>
+                  <a:txBody>
+                    <a:bodyPr/>
+                    <a:lstStyle/>
+                    <a:p>
+                      <a:pPr marL="0" marR="0" indent="0" algn="l" defTabSz="914400" rtl="0" eaLnBrk="1" fontAlgn="auto" latinLnBrk="0" hangingPunct="1">
+                        <a:lnSpc>
+                          <a:spcPct val="100000"/>
+                        </a:lnSpc>
+                        <a:spcBef>
+                          <a:spcPts val="0"/>
+                        </a:spcBef>
+                        <a:spcAft>
+                          <a:spcPts val="0"/>
+                        </a:spcAft>
+                        <a:buClrTx/>
+                        <a:buSzTx/>
+                        <a:buFontTx/>
+                        <a:buNone/>
+                        <a:tabLst/>
+                        <a:defRPr/>
+                      </a:pPr>
+                      <a:r>
+                        <a:rPr kumimoji="0" lang="en-US" sz="1200" b="0" i="0" kern="1200" dirty="0" smtClean="0">
+                          <a:solidFill>
+                            <a:schemeClr val="dk1"/>
+                          </a:solidFill>
+                          <a:effectLst/>
+                          <a:latin typeface="+mn-lt"/>
+                          <a:ea typeface="+mn-ea"/>
+                          <a:cs typeface="+mn-cs"/>
+                        </a:rPr>
+                        <a:t>4. </a:t>
+                      </a:r>
+                      <a:r>
+                        <a:rPr kumimoji="0" lang="en-US" sz="1200" b="0" i="0" kern="1200" dirty="0" err="1" smtClean="0">
+                          <a:solidFill>
+                            <a:schemeClr val="dk1"/>
+                          </a:solidFill>
+                          <a:effectLst/>
+                          <a:latin typeface="Consolas" panose="020B0609020204030204" pitchFamily="49" charset="0"/>
+                          <a:ea typeface="+mn-ea"/>
+                          <a:cs typeface="Consolas" panose="020B0609020204030204" pitchFamily="49" charset="0"/>
+                        </a:rPr>
+                        <a:t>beforeZRemoval</a:t>
+                      </a:r>
+                      <a:r>
+                        <a:rPr kumimoji="0" lang="en-US" sz="1200" b="0" i="0" kern="1200" dirty="0" smtClean="0">
+                          <a:solidFill>
+                            <a:schemeClr val="dk1"/>
+                          </a:solidFill>
+                          <a:effectLst/>
+                          <a:latin typeface="Consolas" panose="020B0609020204030204" pitchFamily="49" charset="0"/>
+                          <a:ea typeface="+mn-ea"/>
+                          <a:cs typeface="Consolas" panose="020B0609020204030204" pitchFamily="49" charset="0"/>
+                        </a:rPr>
+                        <a:t> = true;</a:t>
+                      </a:r>
+                      <a:endParaRPr lang="en-US" sz="1200" dirty="0" smtClean="0">
+                        <a:latin typeface="Consolas" panose="020B0609020204030204" pitchFamily="49" charset="0"/>
+                        <a:cs typeface="Consolas" panose="020B0609020204030204" pitchFamily="49" charset="0"/>
+                      </a:endParaRPr>
+                    </a:p>
+                  </a:txBody>
+                  <a:tcPr/>
+                </a:tc>
+                <a:tc>
+                  <a:txBody>
+                    <a:bodyPr/>
+                    <a:lstStyle/>
+                    <a:p>
+                      <a:endParaRPr lang="en-US" sz="1200" dirty="0"/>
+                    </a:p>
+                  </a:txBody>
+                  <a:tcPr/>
+                </a:tc>
+              </a:tr>
+              <a:tr h="370840">
+                <a:tc>
+                  <a:txBody>
+                    <a:bodyPr/>
+                    <a:lstStyle/>
+                    <a:p>
+                      <a:pPr marL="0" marR="0" indent="0" algn="l" defTabSz="914400" rtl="0" eaLnBrk="1" fontAlgn="auto" latinLnBrk="0" hangingPunct="1">
+                        <a:lnSpc>
+                          <a:spcPct val="100000"/>
+                        </a:lnSpc>
+                        <a:spcBef>
+                          <a:spcPts val="0"/>
+                        </a:spcBef>
+                        <a:spcAft>
+                          <a:spcPts val="0"/>
+                        </a:spcAft>
+                        <a:buClrTx/>
+                        <a:buSzTx/>
+                        <a:buFontTx/>
+                        <a:buNone/>
+                        <a:tabLst/>
+                        <a:defRPr/>
+                      </a:pPr>
+                      <a:r>
+                        <a:rPr kumimoji="0" lang="en-US" sz="1200" b="0" i="0" kern="1200" dirty="0" smtClean="0">
+                          <a:solidFill>
+                            <a:schemeClr val="dk1"/>
+                          </a:solidFill>
+                          <a:effectLst/>
+                          <a:latin typeface="+mn-lt"/>
+                          <a:ea typeface="+mn-ea"/>
+                          <a:cs typeface="+mn-cs"/>
+                        </a:rPr>
+                        <a:t>5. </a:t>
+                      </a:r>
+                      <a:r>
+                        <a:rPr kumimoji="0" lang="en-US" sz="1200" b="0" i="0" kern="1200" dirty="0" err="1" smtClean="0">
+                          <a:solidFill>
+                            <a:schemeClr val="dk1"/>
+                          </a:solidFill>
+                          <a:effectLst/>
+                          <a:latin typeface="Consolas" panose="020B0609020204030204" pitchFamily="49" charset="0"/>
+                          <a:ea typeface="+mn-ea"/>
+                          <a:cs typeface="Consolas" panose="020B0609020204030204" pitchFamily="49" charset="0"/>
+                        </a:rPr>
+                        <a:t>list.remove</a:t>
+                      </a:r>
+                      <a:r>
+                        <a:rPr kumimoji="0" lang="en-US" sz="1200" b="0" i="0" kern="1200" dirty="0" smtClean="0">
+                          <a:solidFill>
+                            <a:schemeClr val="dk1"/>
+                          </a:solidFill>
+                          <a:effectLst/>
+                          <a:latin typeface="Consolas" panose="020B0609020204030204" pitchFamily="49" charset="0"/>
+                          <a:ea typeface="+mn-ea"/>
+                          <a:cs typeface="Consolas" panose="020B0609020204030204" pitchFamily="49" charset="0"/>
+                        </a:rPr>
+                        <a:t>(Z);</a:t>
+                      </a:r>
+                      <a:endParaRPr lang="en-US" sz="1200" dirty="0" smtClean="0">
+                        <a:latin typeface="Consolas" panose="020B0609020204030204" pitchFamily="49" charset="0"/>
+                        <a:cs typeface="Consolas" panose="020B0609020204030204" pitchFamily="49" charset="0"/>
+                      </a:endParaRPr>
+                    </a:p>
+                  </a:txBody>
+                  <a:tcPr/>
+                </a:tc>
+                <a:tc>
+                  <a:txBody>
+                    <a:bodyPr/>
+                    <a:lstStyle/>
+                    <a:p>
+                      <a:endParaRPr lang="en-US" sz="1200" dirty="0"/>
+                    </a:p>
+                  </a:txBody>
+                  <a:tcPr/>
+                </a:tc>
+              </a:tr>
+              <a:tr h="370840">
+                <a:tc>
+                  <a:txBody>
+                    <a:bodyPr/>
+                    <a:lstStyle/>
+                    <a:p>
+                      <a:endParaRPr lang="en-US" sz="1200"/>
+                    </a:p>
+                  </a:txBody>
+                  <a:tcPr/>
+                </a:tc>
+                <a:tc>
+                  <a:txBody>
+                    <a:bodyPr/>
+                    <a:lstStyle/>
+                    <a:p>
+                      <a:pPr marL="0" marR="0" indent="0" algn="l" defTabSz="914400" rtl="0" eaLnBrk="1" fontAlgn="auto" latinLnBrk="0" hangingPunct="1">
+                        <a:lnSpc>
+                          <a:spcPct val="100000"/>
+                        </a:lnSpc>
+                        <a:spcBef>
+                          <a:spcPts val="0"/>
+                        </a:spcBef>
+                        <a:spcAft>
+                          <a:spcPts val="0"/>
+                        </a:spcAft>
+                        <a:buClrTx/>
+                        <a:buSzTx/>
+                        <a:buFontTx/>
+                        <a:buNone/>
+                        <a:tabLst/>
+                        <a:defRPr/>
+                      </a:pPr>
+                      <a:r>
+                        <a:rPr kumimoji="0" lang="en-US" sz="1200" b="0" i="0" kern="1200" dirty="0" smtClean="0">
+                          <a:solidFill>
+                            <a:schemeClr val="dk1"/>
+                          </a:solidFill>
+                          <a:effectLst/>
+                          <a:latin typeface="+mn-lt"/>
+                          <a:ea typeface="+mn-ea"/>
+                          <a:cs typeface="+mn-cs"/>
+                        </a:rPr>
+                        <a:t>6. The cache miss finally returns and the value is indeed null (because </a:t>
+                      </a:r>
+                      <a:r>
+                        <a:rPr kumimoji="0" lang="en-US" sz="1200" b="0" i="0" kern="1200" dirty="0" err="1" smtClean="0">
+                          <a:solidFill>
+                            <a:schemeClr val="dk1"/>
+                          </a:solidFill>
+                          <a:effectLst/>
+                          <a:latin typeface="Consolas" panose="020B0609020204030204" pitchFamily="49" charset="0"/>
+                          <a:ea typeface="+mn-ea"/>
+                          <a:cs typeface="Consolas" panose="020B0609020204030204" pitchFamily="49" charset="0"/>
+                        </a:rPr>
+                        <a:t>list.remove</a:t>
+                      </a:r>
+                      <a:r>
+                        <a:rPr kumimoji="0" lang="en-US" sz="1200" b="0" i="0" kern="1200" dirty="0" smtClean="0">
+                          <a:solidFill>
+                            <a:schemeClr val="dk1"/>
+                          </a:solidFill>
+                          <a:effectLst/>
+                          <a:latin typeface="Consolas" panose="020B0609020204030204" pitchFamily="49" charset="0"/>
+                          <a:ea typeface="+mn-ea"/>
+                          <a:cs typeface="Consolas" panose="020B0609020204030204" pitchFamily="49" charset="0"/>
+                        </a:rPr>
+                        <a:t>(Z) </a:t>
+                      </a:r>
+                      <a:r>
+                        <a:rPr kumimoji="0" lang="en-US" sz="1200" b="0" i="0" kern="1200" dirty="0" smtClean="0">
+                          <a:solidFill>
+                            <a:schemeClr val="dk1"/>
+                          </a:solidFill>
+                          <a:effectLst/>
+                          <a:latin typeface="+mn-lt"/>
+                          <a:ea typeface="+mn-ea"/>
+                          <a:cs typeface="+mn-cs"/>
+                        </a:rPr>
+                        <a:t>has completed), which means </a:t>
+                      </a:r>
+                      <a:r>
+                        <a:rPr kumimoji="0" lang="en-US" sz="1200" b="0" i="0" kern="1200" dirty="0" err="1" smtClean="0">
+                          <a:solidFill>
+                            <a:schemeClr val="dk1"/>
+                          </a:solidFill>
+                          <a:effectLst/>
+                          <a:latin typeface="Consolas" panose="020B0609020204030204" pitchFamily="49" charset="0"/>
+                          <a:ea typeface="+mn-ea"/>
+                          <a:cs typeface="Consolas" panose="020B0609020204030204" pitchFamily="49" charset="0"/>
+                        </a:rPr>
+                        <a:t>lz</a:t>
+                      </a:r>
+                      <a:r>
+                        <a:rPr kumimoji="0" lang="en-US" sz="1200" b="0" i="0" kern="1200" dirty="0" smtClean="0">
+                          <a:solidFill>
+                            <a:schemeClr val="dk1"/>
+                          </a:solidFill>
+                          <a:effectLst/>
+                          <a:latin typeface="Consolas" panose="020B0609020204030204" pitchFamily="49" charset="0"/>
+                          <a:ea typeface="+mn-ea"/>
+                          <a:cs typeface="Consolas" panose="020B0609020204030204" pitchFamily="49" charset="0"/>
+                        </a:rPr>
+                        <a:t> = false</a:t>
+                      </a:r>
+                      <a:endParaRPr lang="en-US" sz="1200" dirty="0" smtClean="0">
+                        <a:latin typeface="Consolas" panose="020B0609020204030204" pitchFamily="49" charset="0"/>
+                        <a:cs typeface="Consolas" panose="020B0609020204030204" pitchFamily="49" charset="0"/>
+                      </a:endParaRPr>
+                    </a:p>
+                  </a:txBody>
+                  <a:tcPr/>
+                </a:tc>
+              </a:tr>
+            </a:tbl>
+          </a:graphicData>
+        </a:graphic>
+      </p:graphicFrame>
+    </p:spTree>
+    <p:extLst>
+      <p:ext uri="{BB962C8B-B14F-4D97-AF65-F5344CB8AC3E}">
+        <p14:creationId xmlns:p14="http://schemas.microsoft.com/office/powerpoint/2010/main" val="3569642702"/>
+      </p:ext>
+    </p:extLst>
+  </p:cSld>
+  <p:clrMapOvr>
+    <a:masterClrMapping/>
+  </p:clrMapOvr>
+  <p:timing>
+    <p:tnLst>
+      <p:par>
+        <p:cTn id="1" dur="indefinite" restart="never" nodeType="tmRoot"/>
+      </p:par>
+    </p:tnLst>
+  </p:timing>
+</p:sld>
+</file>
+
 <file path=ppt/slides/slide3.xml><?xml version="1.0" encoding="utf-8"?>
 <p:sld xmlns:a="http://schemas.openxmlformats.org/drawingml/2006/main" xmlns:r="http://schemas.openxmlformats.org/officeDocument/2006/relationships" xmlns:p="http://schemas.openxmlformats.org/presentationml/2006/main">
   <p:cSld>
@@ -19667,12 +21561,15 @@
         <p:spPr>
           <a:xfrm>
             <a:off x="1893683" y="4343400"/>
-            <a:ext cx="7239000" cy="2031325"/>
+            <a:ext cx="7239000" cy="2308324"/>
           </a:xfrm>
           <a:prstGeom prst="rect">
             <a:avLst/>
           </a:prstGeom>
           <a:noFill/>
+          <a:ln>
+            <a:noFill/>
+          </a:ln>
         </p:spPr>
         <p:txBody>
           <a:bodyPr wrap="square" rtlCol="0">
@@ -19705,110 +21602,137 @@
                 </a:solidFill>
                 <a:latin typeface="Consolas"/>
               </a:rPr>
-              <a:t>() {</a:t>
-            </a:r>
-          </a:p>
-          <a:p>
+              <a:t>() </a:t>
+            </a:r>
+            <a:r>
+              <a:rPr lang="en-US" dirty="0" smtClean="0">
+                <a:solidFill>
+                  <a:srgbClr val="000000"/>
+                </a:solidFill>
+                <a:latin typeface="Consolas"/>
+              </a:rPr>
+              <a:t>{</a:t>
+            </a:r>
+          </a:p>
+          <a:p>
+            <a:r>
+              <a:rPr lang="en-US" dirty="0">
+                <a:solidFill>
+                  <a:srgbClr val="000000"/>
+                </a:solidFill>
+                <a:latin typeface="Consolas"/>
+              </a:rPr>
+              <a:t> </a:t>
+            </a:r>
+            <a:r>
+              <a:rPr lang="en-US" dirty="0" smtClean="0">
+                <a:solidFill>
+                  <a:srgbClr val="000000"/>
+                </a:solidFill>
+                <a:latin typeface="Consolas"/>
+              </a:rPr>
+              <a:t>   E </a:t>
+            </a:r>
+            <a:r>
+              <a:rPr lang="en-US" dirty="0" err="1">
+                <a:solidFill>
+                  <a:schemeClr val="accent6"/>
+                </a:solidFill>
+                <a:latin typeface="Consolas"/>
+              </a:rPr>
+              <a:t>localitem</a:t>
+            </a:r>
+            <a:r>
+              <a:rPr lang="en-US" dirty="0" smtClean="0">
+                <a:solidFill>
+                  <a:srgbClr val="000000"/>
+                </a:solidFill>
+                <a:latin typeface="Consolas"/>
+              </a:rPr>
+              <a:t> = </a:t>
+            </a:r>
+            <a:r>
+              <a:rPr lang="en-US" b="1" dirty="0">
+                <a:solidFill>
+                  <a:srgbClr val="000000"/>
+                </a:solidFill>
+                <a:latin typeface="Consolas"/>
+              </a:rPr>
+              <a:t>(E)</a:t>
+            </a:r>
+            <a:r>
+              <a:rPr lang="en-US" b="1" i="1" dirty="0" err="1">
+                <a:solidFill>
+                  <a:srgbClr val="0000C0"/>
+                </a:solidFill>
+                <a:latin typeface="Consolas"/>
+              </a:rPr>
+              <a:t>UNSAFE</a:t>
+            </a:r>
+            <a:r>
+              <a:rPr lang="en-US" b="1" i="1" dirty="0" err="1">
+                <a:solidFill>
+                  <a:srgbClr val="000000"/>
+                </a:solidFill>
+                <a:latin typeface="Consolas"/>
+              </a:rPr>
+              <a:t>.getObject</a:t>
+            </a:r>
+            <a:r>
+              <a:rPr lang="en-US" b="1" i="1" dirty="0">
+                <a:solidFill>
+                  <a:srgbClr val="000000"/>
+                </a:solidFill>
+                <a:latin typeface="Consolas"/>
+              </a:rPr>
+              <a:t>(</a:t>
+            </a:r>
+            <a:r>
+              <a:rPr lang="en-US" b="1" i="1" dirty="0">
+                <a:solidFill>
+                  <a:srgbClr val="7F0055"/>
+                </a:solidFill>
+                <a:latin typeface="Consolas"/>
+              </a:rPr>
+              <a:t>this</a:t>
+            </a:r>
+            <a:r>
+              <a:rPr lang="en-US" b="1" i="1" dirty="0">
+                <a:solidFill>
+                  <a:srgbClr val="000000"/>
+                </a:solidFill>
+                <a:latin typeface="Consolas"/>
+              </a:rPr>
+              <a:t>, </a:t>
+            </a:r>
+            <a:r>
+              <a:rPr lang="en-US" b="1" i="1" dirty="0" err="1">
+                <a:solidFill>
+                  <a:srgbClr val="0000C0"/>
+                </a:solidFill>
+                <a:latin typeface="Consolas"/>
+              </a:rPr>
+              <a:t>itemOffset</a:t>
+            </a:r>
+            <a:r>
+              <a:rPr lang="en-US" b="1" i="1" dirty="0" smtClean="0">
+                <a:solidFill>
+                  <a:srgbClr val="000000"/>
+                </a:solidFill>
+                <a:latin typeface="Consolas"/>
+              </a:rPr>
+              <a:t>)</a:t>
+            </a:r>
             <a:r>
               <a:rPr lang="en-US" b="1" dirty="0" smtClean="0">
                 <a:solidFill>
-                  <a:srgbClr val="7F0055"/>
-                </a:solidFill>
-                <a:latin typeface="Consolas"/>
-              </a:rPr>
-              <a:t>    return</a:t>
-            </a:r>
-            <a:r>
-              <a:rPr lang="en-US" b="1" dirty="0" smtClean="0">
-                <a:solidFill>
-                  <a:srgbClr val="000000"/>
-                </a:solidFill>
-                <a:latin typeface="Consolas"/>
-              </a:rPr>
-              <a:t> </a:t>
-            </a:r>
-            <a:r>
-              <a:rPr lang="en-US" b="1" dirty="0">
-                <a:solidFill>
-                  <a:srgbClr val="000000"/>
-                </a:solidFill>
-                <a:latin typeface="Consolas"/>
-              </a:rPr>
-              <a:t>(E)</a:t>
-            </a:r>
-            <a:r>
-              <a:rPr lang="en-US" b="1" i="1" dirty="0" err="1">
-                <a:solidFill>
-                  <a:srgbClr val="0000C0"/>
-                </a:solidFill>
-                <a:latin typeface="Consolas"/>
-              </a:rPr>
-              <a:t>UNSAFE</a:t>
-            </a:r>
-            <a:r>
-              <a:rPr lang="en-US" b="1" i="1" dirty="0" err="1">
-                <a:solidFill>
-                  <a:srgbClr val="000000"/>
-                </a:solidFill>
-                <a:latin typeface="Consolas"/>
-              </a:rPr>
-              <a:t>.getObject</a:t>
-            </a:r>
-            <a:r>
-              <a:rPr lang="en-US" b="1" i="1" dirty="0">
-                <a:solidFill>
-                  <a:srgbClr val="000000"/>
-                </a:solidFill>
-                <a:latin typeface="Consolas"/>
-              </a:rPr>
-              <a:t>(</a:t>
-            </a:r>
-            <a:r>
-              <a:rPr lang="en-US" b="1" i="1" dirty="0">
-                <a:solidFill>
-                  <a:srgbClr val="7F0055"/>
-                </a:solidFill>
-                <a:latin typeface="Consolas"/>
-              </a:rPr>
-              <a:t>this</a:t>
-            </a:r>
-            <a:r>
-              <a:rPr lang="en-US" b="1" i="1" dirty="0">
-                <a:solidFill>
-                  <a:srgbClr val="000000"/>
-                </a:solidFill>
-                <a:latin typeface="Consolas"/>
-              </a:rPr>
-              <a:t>, </a:t>
-            </a:r>
-            <a:r>
-              <a:rPr lang="en-US" b="1" i="1" dirty="0" err="1">
-                <a:solidFill>
-                  <a:srgbClr val="0000C0"/>
-                </a:solidFill>
-                <a:latin typeface="Consolas"/>
-              </a:rPr>
-              <a:t>itemOffset</a:t>
-            </a:r>
-            <a:r>
-              <a:rPr lang="en-US" b="1" i="1" dirty="0">
-                <a:solidFill>
-                  <a:srgbClr val="000000"/>
-                </a:solidFill>
-                <a:latin typeface="Consolas"/>
-              </a:rPr>
-              <a:t>)</a:t>
-            </a:r>
-            <a:r>
-              <a:rPr lang="en-US" b="1" dirty="0" smtClean="0">
-                <a:solidFill>
                   <a:srgbClr val="000000"/>
                 </a:solidFill>
                 <a:latin typeface="Consolas"/>
               </a:rPr>
               <a:t>;</a:t>
             </a:r>
-            <a:endParaRPr lang="en-US" b="1" i="1" dirty="0">
+            <a:endParaRPr lang="en-US" dirty="0">
               <a:solidFill>
                 <a:srgbClr val="000000"/>
               </a:solidFill>
@@ -19817,6 +21741,101 @@
           </a:p>
           <a:p>
             <a:r>
+              <a:rPr lang="en-US" b="1" dirty="0" smtClean="0">
+                <a:solidFill>
+                  <a:srgbClr val="7F0055"/>
+                </a:solidFill>
+                <a:latin typeface="Consolas"/>
+              </a:rPr>
+              <a:t>    return</a:t>
+            </a:r>
+            <a:r>
+              <a:rPr lang="en-US" b="1" dirty="0" smtClean="0">
+                <a:solidFill>
+                  <a:srgbClr val="000000"/>
+                </a:solidFill>
+                <a:highlight>
+                  <a:srgbClr val="D4D4D4"/>
+                </a:highlight>
+                <a:latin typeface="Consolas"/>
+              </a:rPr>
+              <a:t> </a:t>
+            </a:r>
+            <a:r>
+              <a:rPr lang="en-US" dirty="0" err="1">
+                <a:solidFill>
+                  <a:schemeClr val="accent6"/>
+                </a:solidFill>
+                <a:latin typeface="Consolas"/>
+              </a:rPr>
+              <a:t>localitem</a:t>
+            </a:r>
+            <a:r>
+              <a:rPr lang="en-US" b="1" dirty="0">
+                <a:solidFill>
+                  <a:srgbClr val="000000"/>
+                </a:solidFill>
+                <a:latin typeface="Consolas"/>
+              </a:rPr>
+              <a:t> == </a:t>
+            </a:r>
+            <a:r>
+              <a:rPr lang="en-US" b="1" dirty="0">
+                <a:solidFill>
+                  <a:srgbClr val="7F0055"/>
+                </a:solidFill>
+                <a:latin typeface="Consolas"/>
+              </a:rPr>
+              <a:t>null</a:t>
+            </a:r>
+            <a:r>
+              <a:rPr lang="en-US" b="1" dirty="0">
+                <a:solidFill>
+                  <a:srgbClr val="000000"/>
+                </a:solidFill>
+                <a:latin typeface="Consolas"/>
+              </a:rPr>
+              <a:t> ? </a:t>
+            </a:r>
+            <a:r>
+              <a:rPr lang="en-US" dirty="0">
+                <a:solidFill>
+                  <a:srgbClr val="0000C0"/>
+                </a:solidFill>
+                <a:latin typeface="Consolas"/>
+              </a:rPr>
+              <a:t>item</a:t>
+            </a:r>
+            <a:r>
+              <a:rPr lang="en-US" b="1" dirty="0">
+                <a:solidFill>
+                  <a:srgbClr val="000000"/>
+                </a:solidFill>
+                <a:latin typeface="Consolas"/>
+              </a:rPr>
+              <a:t> : </a:t>
+            </a:r>
+            <a:r>
+              <a:rPr lang="en-US" dirty="0" err="1">
+                <a:solidFill>
+                  <a:schemeClr val="accent6"/>
+                </a:solidFill>
+                <a:latin typeface="Consolas"/>
+              </a:rPr>
+              <a:t>localitem</a:t>
+            </a:r>
+            <a:r>
+              <a:rPr lang="en-US" b="1" dirty="0">
+                <a:solidFill>
+                  <a:srgbClr val="000000"/>
+                </a:solidFill>
+                <a:latin typeface="Consolas"/>
+              </a:rPr>
+              <a:t>;</a:t>
+            </a:r>
+          </a:p>
+          <a:p>
+            <a:r>
               <a:rPr lang="en-US" dirty="0" smtClean="0">
                 <a:solidFill>
                   <a:srgbClr val="000000"/>
@@ -19825,12 +21844,6 @@
               </a:rPr>
               <a:t>}</a:t>
             </a:r>
-            <a:endParaRPr lang="en-US" dirty="0" smtClean="0">
-              <a:solidFill>
-                <a:srgbClr val="000000"/>
-              </a:solidFill>
-              <a:latin typeface="Consolas"/>
-            </a:endParaRPr>
           </a:p>
           <a:p>
             <a:endParaRPr lang="en-US" dirty="0">

</xml_diff>